<commit_message>
Update Customers’ Buying Journey Analysis_Alissa.pptx
</commit_message>
<xml_diff>
--- a/Customers’ Buying Journey Analysis_Alissa.pptx
+++ b/Customers’ Buying Journey Analysis_Alissa.pptx
@@ -5,10 +5,10 @@
     <p:sldMasterId id="2147483648" r:id="rId4"/>
   </p:sldMasterIdLst>
   <p:notesMasterIdLst>
-    <p:notesMasterId r:id="rId23"/>
+    <p:notesMasterId r:id="rId21"/>
   </p:notesMasterIdLst>
   <p:handoutMasterIdLst>
-    <p:handoutMasterId r:id="rId24"/>
+    <p:handoutMasterId r:id="rId22"/>
   </p:handoutMasterIdLst>
   <p:sldIdLst>
     <p:sldId id="292" r:id="rId5"/>
@@ -22,13 +22,11 @@
     <p:sldId id="257" r:id="rId13"/>
     <p:sldId id="282" r:id="rId14"/>
     <p:sldId id="298" r:id="rId15"/>
-    <p:sldId id="299" r:id="rId16"/>
-    <p:sldId id="300" r:id="rId17"/>
-    <p:sldId id="301" r:id="rId18"/>
-    <p:sldId id="283" r:id="rId19"/>
-    <p:sldId id="302" r:id="rId20"/>
-    <p:sldId id="293" r:id="rId21"/>
-    <p:sldId id="289" r:id="rId22"/>
+    <p:sldId id="301" r:id="rId16"/>
+    <p:sldId id="283" r:id="rId17"/>
+    <p:sldId id="302" r:id="rId18"/>
+    <p:sldId id="293" r:id="rId19"/>
+    <p:sldId id="289" r:id="rId20"/>
   </p:sldIdLst>
   <p:sldSz cx="12192000" cy="6858000"/>
   <p:notesSz cx="6858000" cy="9144000"/>
@@ -155,6 +153,182 @@
 </p188:authorLst>
 </file>
 
+<file path=ppt/changesInfos/changesInfo1.xml><?xml version="1.0" encoding="utf-8"?>
+<pc:chgInfo xmlns:a="http://schemas.openxmlformats.org/drawingml/2006/main" xmlns:r="http://schemas.openxmlformats.org/officeDocument/2006/relationships" xmlns:ac="http://schemas.microsoft.com/office/drawing/2013/main/command" xmlns:pc="http://schemas.microsoft.com/office/powerpoint/2013/main/command">
+  <pc:docChgLst>
+    <pc:chgData name="Dao, Alissa" userId="e2f969b0-23ed-4676-adfc-418f2c9fd0c2" providerId="ADAL" clId="{4842CCC7-E381-4634-9BA1-4F1109A5BB10}"/>
+    <pc:docChg chg="undo custSel addSld delSld modSld">
+      <pc:chgData name="Dao, Alissa" userId="e2f969b0-23ed-4676-adfc-418f2c9fd0c2" providerId="ADAL" clId="{4842CCC7-E381-4634-9BA1-4F1109A5BB10}" dt="2024-10-02T20:06:27.276" v="44" actId="1076"/>
+      <pc:docMkLst>
+        <pc:docMk/>
+      </pc:docMkLst>
+      <pc:sldChg chg="add del">
+        <pc:chgData name="Dao, Alissa" userId="e2f969b0-23ed-4676-adfc-418f2c9fd0c2" providerId="ADAL" clId="{4842CCC7-E381-4634-9BA1-4F1109A5BB10}" dt="2024-10-02T19:52:32.219" v="33" actId="47"/>
+        <pc:sldMkLst>
+          <pc:docMk/>
+          <pc:sldMk cId="2775535166" sldId="275"/>
+        </pc:sldMkLst>
+      </pc:sldChg>
+      <pc:sldChg chg="addSp delSp modSp mod">
+        <pc:chgData name="Dao, Alissa" userId="e2f969b0-23ed-4676-adfc-418f2c9fd0c2" providerId="ADAL" clId="{4842CCC7-E381-4634-9BA1-4F1109A5BB10}" dt="2024-10-02T19:48:10.312" v="31" actId="478"/>
+        <pc:sldMkLst>
+          <pc:docMk/>
+          <pc:sldMk cId="2517140333" sldId="283"/>
+        </pc:sldMkLst>
+        <pc:spChg chg="add del mod">
+          <ac:chgData name="Dao, Alissa" userId="e2f969b0-23ed-4676-adfc-418f2c9fd0c2" providerId="ADAL" clId="{4842CCC7-E381-4634-9BA1-4F1109A5BB10}" dt="2024-10-02T19:47:29.338" v="24" actId="478"/>
+          <ac:spMkLst>
+            <pc:docMk/>
+            <pc:sldMk cId="2517140333" sldId="283"/>
+            <ac:spMk id="3" creationId="{D509BD01-A427-4826-A6FA-12EF44D979BA}"/>
+          </ac:spMkLst>
+        </pc:spChg>
+        <pc:spChg chg="add del mod">
+          <ac:chgData name="Dao, Alissa" userId="e2f969b0-23ed-4676-adfc-418f2c9fd0c2" providerId="ADAL" clId="{4842CCC7-E381-4634-9BA1-4F1109A5BB10}" dt="2024-10-02T19:47:38.209" v="26" actId="478"/>
+          <ac:spMkLst>
+            <pc:docMk/>
+            <pc:sldMk cId="2517140333" sldId="283"/>
+            <ac:spMk id="6" creationId="{9870BBE8-36C2-4CE3-AEAA-821A7A400689}"/>
+          </ac:spMkLst>
+        </pc:spChg>
+        <pc:spChg chg="add del mod">
+          <ac:chgData name="Dao, Alissa" userId="e2f969b0-23ed-4676-adfc-418f2c9fd0c2" providerId="ADAL" clId="{4842CCC7-E381-4634-9BA1-4F1109A5BB10}" dt="2024-10-02T19:48:03.648" v="29" actId="478"/>
+          <ac:spMkLst>
+            <pc:docMk/>
+            <pc:sldMk cId="2517140333" sldId="283"/>
+            <ac:spMk id="9" creationId="{D273D6CD-156C-442C-9DC8-AC68676FA67B}"/>
+          </ac:spMkLst>
+        </pc:spChg>
+        <pc:spChg chg="add mod">
+          <ac:chgData name="Dao, Alissa" userId="e2f969b0-23ed-4676-adfc-418f2c9fd0c2" providerId="ADAL" clId="{4842CCC7-E381-4634-9BA1-4F1109A5BB10}" dt="2024-10-02T19:48:10.312" v="31" actId="478"/>
+          <ac:spMkLst>
+            <pc:docMk/>
+            <pc:sldMk cId="2517140333" sldId="283"/>
+            <ac:spMk id="13" creationId="{E9FBBAB6-B92D-477A-BB2D-922C57FEB07D}"/>
+          </ac:spMkLst>
+        </pc:spChg>
+        <pc:spChg chg="mod">
+          <ac:chgData name="Dao, Alissa" userId="e2f969b0-23ed-4676-adfc-418f2c9fd0c2" providerId="ADAL" clId="{4842CCC7-E381-4634-9BA1-4F1109A5BB10}" dt="2024-10-02T19:48:08.885" v="30" actId="1076"/>
+          <ac:spMkLst>
+            <pc:docMk/>
+            <pc:sldMk cId="2517140333" sldId="283"/>
+            <ac:spMk id="37" creationId="{3A30B02E-FBE1-41C5-AF6E-E1013275E84A}"/>
+          </ac:spMkLst>
+        </pc:spChg>
+        <pc:spChg chg="del mod">
+          <ac:chgData name="Dao, Alissa" userId="e2f969b0-23ed-4676-adfc-418f2c9fd0c2" providerId="ADAL" clId="{4842CCC7-E381-4634-9BA1-4F1109A5BB10}" dt="2024-10-02T19:48:00.842" v="28" actId="478"/>
+          <ac:spMkLst>
+            <pc:docMk/>
+            <pc:sldMk cId="2517140333" sldId="283"/>
+            <ac:spMk id="41" creationId="{DBA8686B-D3EF-40DF-939C-F875885DD598}"/>
+          </ac:spMkLst>
+        </pc:spChg>
+        <pc:spChg chg="del">
+          <ac:chgData name="Dao, Alissa" userId="e2f969b0-23ed-4676-adfc-418f2c9fd0c2" providerId="ADAL" clId="{4842CCC7-E381-4634-9BA1-4F1109A5BB10}" dt="2024-10-02T19:47:24.343" v="23" actId="478"/>
+          <ac:spMkLst>
+            <pc:docMk/>
+            <pc:sldMk cId="2517140333" sldId="283"/>
+            <ac:spMk id="43" creationId="{759A333C-6D37-427A-BE2A-4C2660134A5A}"/>
+          </ac:spMkLst>
+        </pc:spChg>
+        <pc:picChg chg="del">
+          <ac:chgData name="Dao, Alissa" userId="e2f969b0-23ed-4676-adfc-418f2c9fd0c2" providerId="ADAL" clId="{4842CCC7-E381-4634-9BA1-4F1109A5BB10}" dt="2024-10-02T19:48:10.312" v="31" actId="478"/>
+          <ac:picMkLst>
+            <pc:docMk/>
+            <pc:sldMk cId="2517140333" sldId="283"/>
+            <ac:picMk id="8" creationId="{66D3A5E9-F687-402F-8477-EE4CD418CA67}"/>
+          </ac:picMkLst>
+        </pc:picChg>
+        <pc:picChg chg="del">
+          <ac:chgData name="Dao, Alissa" userId="e2f969b0-23ed-4676-adfc-418f2c9fd0c2" providerId="ADAL" clId="{4842CCC7-E381-4634-9BA1-4F1109A5BB10}" dt="2024-10-02T19:47:35.591" v="25" actId="478"/>
+          <ac:picMkLst>
+            <pc:docMk/>
+            <pc:sldMk cId="2517140333" sldId="283"/>
+            <ac:picMk id="90" creationId="{241F4F4E-4DAB-34E3-D036-85F0CB76A536}"/>
+          </ac:picMkLst>
+        </pc:picChg>
+      </pc:sldChg>
+      <pc:sldChg chg="delSp modSp mod">
+        <pc:chgData name="Dao, Alissa" userId="e2f969b0-23ed-4676-adfc-418f2c9fd0c2" providerId="ADAL" clId="{4842CCC7-E381-4634-9BA1-4F1109A5BB10}" dt="2024-10-02T20:06:27.276" v="44" actId="1076"/>
+        <pc:sldMkLst>
+          <pc:docMk/>
+          <pc:sldMk cId="4182148033" sldId="293"/>
+        </pc:sldMkLst>
+        <pc:spChg chg="del">
+          <ac:chgData name="Dao, Alissa" userId="e2f969b0-23ed-4676-adfc-418f2c9fd0c2" providerId="ADAL" clId="{4842CCC7-E381-4634-9BA1-4F1109A5BB10}" dt="2024-10-02T20:06:11.952" v="40" actId="478"/>
+          <ac:spMkLst>
+            <pc:docMk/>
+            <pc:sldMk cId="4182148033" sldId="293"/>
+            <ac:spMk id="9" creationId="{3DC01FA8-55C1-448C-8006-2879BB557858}"/>
+          </ac:spMkLst>
+        </pc:spChg>
+        <pc:spChg chg="del">
+          <ac:chgData name="Dao, Alissa" userId="e2f969b0-23ed-4676-adfc-418f2c9fd0c2" providerId="ADAL" clId="{4842CCC7-E381-4634-9BA1-4F1109A5BB10}" dt="2024-10-02T20:06:14.503" v="41" actId="478"/>
+          <ac:spMkLst>
+            <pc:docMk/>
+            <pc:sldMk cId="4182148033" sldId="293"/>
+            <ac:spMk id="10" creationId="{7F0EE3C4-8F01-4BB0-B6C7-FE23022B8ED4}"/>
+          </ac:spMkLst>
+        </pc:spChg>
+        <pc:spChg chg="mod">
+          <ac:chgData name="Dao, Alissa" userId="e2f969b0-23ed-4676-adfc-418f2c9fd0c2" providerId="ADAL" clId="{4842CCC7-E381-4634-9BA1-4F1109A5BB10}" dt="2024-10-02T20:06:23.779" v="43" actId="1076"/>
+          <ac:spMkLst>
+            <pc:docMk/>
+            <pc:sldMk cId="4182148033" sldId="293"/>
+            <ac:spMk id="35" creationId="{2C8E94EA-2767-D144-C1BB-32AA2C99723B}"/>
+          </ac:spMkLst>
+        </pc:spChg>
+        <pc:spChg chg="mod">
+          <ac:chgData name="Dao, Alissa" userId="e2f969b0-23ed-4676-adfc-418f2c9fd0c2" providerId="ADAL" clId="{4842CCC7-E381-4634-9BA1-4F1109A5BB10}" dt="2024-10-02T20:06:18.385" v="42" actId="1076"/>
+          <ac:spMkLst>
+            <pc:docMk/>
+            <pc:sldMk cId="4182148033" sldId="293"/>
+            <ac:spMk id="43" creationId="{520E98B6-7B33-8FD4-A662-31DD4B85E22E}"/>
+          </ac:spMkLst>
+        </pc:spChg>
+        <pc:spChg chg="mod">
+          <ac:chgData name="Dao, Alissa" userId="e2f969b0-23ed-4676-adfc-418f2c9fd0c2" providerId="ADAL" clId="{4842CCC7-E381-4634-9BA1-4F1109A5BB10}" dt="2024-10-02T20:06:27.276" v="44" actId="1076"/>
+          <ac:spMkLst>
+            <pc:docMk/>
+            <pc:sldMk cId="4182148033" sldId="293"/>
+            <ac:spMk id="44" creationId="{78466807-A2DA-EC5D-ACDE-B83D6F7169EA}"/>
+          </ac:spMkLst>
+        </pc:spChg>
+      </pc:sldChg>
+      <pc:sldChg chg="modSp mod">
+        <pc:chgData name="Dao, Alissa" userId="e2f969b0-23ed-4676-adfc-418f2c9fd0c2" providerId="ADAL" clId="{4842CCC7-E381-4634-9BA1-4F1109A5BB10}" dt="2024-10-02T19:56:15.089" v="38" actId="20577"/>
+        <pc:sldMkLst>
+          <pc:docMk/>
+          <pc:sldMk cId="32955924" sldId="294"/>
+        </pc:sldMkLst>
+        <pc:spChg chg="mod">
+          <ac:chgData name="Dao, Alissa" userId="e2f969b0-23ed-4676-adfc-418f2c9fd0c2" providerId="ADAL" clId="{4842CCC7-E381-4634-9BA1-4F1109A5BB10}" dt="2024-10-02T19:56:15.089" v="38" actId="20577"/>
+          <ac:spMkLst>
+            <pc:docMk/>
+            <pc:sldMk cId="32955924" sldId="294"/>
+            <ac:spMk id="3" creationId="{EB296A2E-97F8-434E-877E-E47D5A44175E}"/>
+          </ac:spMkLst>
+        </pc:spChg>
+      </pc:sldChg>
+      <pc:sldChg chg="del">
+        <pc:chgData name="Dao, Alissa" userId="e2f969b0-23ed-4676-adfc-418f2c9fd0c2" providerId="ADAL" clId="{4842CCC7-E381-4634-9BA1-4F1109A5BB10}" dt="2024-10-02T19:45:39.297" v="22" actId="47"/>
+        <pc:sldMkLst>
+          <pc:docMk/>
+          <pc:sldMk cId="1939385481" sldId="299"/>
+        </pc:sldMkLst>
+      </pc:sldChg>
+      <pc:sldChg chg="del">
+        <pc:chgData name="Dao, Alissa" userId="e2f969b0-23ed-4676-adfc-418f2c9fd0c2" providerId="ADAL" clId="{4842CCC7-E381-4634-9BA1-4F1109A5BB10}" dt="2024-10-02T20:03:39.607" v="39" actId="47"/>
+        <pc:sldMkLst>
+          <pc:docMk/>
+          <pc:sldMk cId="425780015" sldId="300"/>
+        </pc:sldMkLst>
+      </pc:sldChg>
+    </pc:docChg>
+  </pc:docChgLst>
+</pc:chgInfo>
+</file>
+
 <file path=ppt/handoutMasters/handoutMaster1.xml><?xml version="1.0" encoding="utf-8"?>
 <p:handoutMaster xmlns:a="http://schemas.openxmlformats.org/drawingml/2006/main" xmlns:r="http://schemas.openxmlformats.org/officeDocument/2006/relationships" xmlns:p="http://schemas.openxmlformats.org/presentationml/2006/main">
   <p:cSld>
@@ -249,7 +423,7 @@
           <a:p>
             <a:fld id="{8CD26A2A-0A96-0647-84E5-C82F2EFD9474}" type="datetimeFigureOut">
               <a:rPr lang="en-US" smtClean="0"/>
-              <a:t>10/1/2024</a:t>
+              <a:t>10/2/2024</a:t>
             </a:fld>
             <a:endParaRPr lang="en-US" dirty="0"/>
           </a:p>
@@ -514,7 +688,7 @@
           <a:p>
             <a:fld id="{D458D246-FB21-4ACB-9068-6447CC7872F8}" type="datetimeFigureOut">
               <a:rPr lang="en-US" smtClean="0"/>
-              <a:t>10/1/2024</a:t>
+              <a:t>10/2/2024</a:t>
             </a:fld>
             <a:endParaRPr lang="en-US"/>
           </a:p>
@@ -1151,7 +1325,7 @@
     </p:spTree>
     <p:extLst>
       <p:ext uri="{BB962C8B-B14F-4D97-AF65-F5344CB8AC3E}">
-        <p14:creationId xmlns:p14="http://schemas.microsoft.com/office/powerpoint/2010/main" val="1438104999"/>
+        <p14:creationId xmlns:p14="http://schemas.microsoft.com/office/powerpoint/2010/main" val="3930107716"/>
       </p:ext>
     </p:extLst>
   </p:cSld>
@@ -1259,7 +1433,7 @@
     </p:spTree>
     <p:extLst>
       <p:ext uri="{BB962C8B-B14F-4D97-AF65-F5344CB8AC3E}">
-        <p14:creationId xmlns:p14="http://schemas.microsoft.com/office/powerpoint/2010/main" val="1306382496"/>
+        <p14:creationId xmlns:p14="http://schemas.microsoft.com/office/powerpoint/2010/main" val="820645791"/>
       </p:ext>
     </p:extLst>
   </p:cSld>
@@ -1367,7 +1541,7 @@
     </p:spTree>
     <p:extLst>
       <p:ext uri="{BB962C8B-B14F-4D97-AF65-F5344CB8AC3E}">
-        <p14:creationId xmlns:p14="http://schemas.microsoft.com/office/powerpoint/2010/main" val="3930107716"/>
+        <p14:creationId xmlns:p14="http://schemas.microsoft.com/office/powerpoint/2010/main" val="2277803088"/>
       </p:ext>
     </p:extLst>
   </p:cSld>
@@ -1475,7 +1649,7 @@
     </p:spTree>
     <p:extLst>
       <p:ext uri="{BB962C8B-B14F-4D97-AF65-F5344CB8AC3E}">
-        <p14:creationId xmlns:p14="http://schemas.microsoft.com/office/powerpoint/2010/main" val="820645791"/>
+        <p14:creationId xmlns:p14="http://schemas.microsoft.com/office/powerpoint/2010/main" val="1889056454"/>
       </p:ext>
     </p:extLst>
   </p:cSld>
@@ -1575,222 +1749,6 @@
             <a:fld id="{017105BD-6D6F-49DB-9DE4-D4A6452D7E5F}" type="slidenum">
               <a:rPr lang="en-US" altLang="zh-CN" noProof="0" smtClean="0"/>
               <a:t>16</a:t>
-            </a:fld>
-            <a:endParaRPr lang="en-US" altLang="zh-CN" noProof="0" dirty="0"/>
-          </a:p>
-        </p:txBody>
-      </p:sp>
-    </p:spTree>
-    <p:extLst>
-      <p:ext uri="{BB962C8B-B14F-4D97-AF65-F5344CB8AC3E}">
-        <p14:creationId xmlns:p14="http://schemas.microsoft.com/office/powerpoint/2010/main" val="2277803088"/>
-      </p:ext>
-    </p:extLst>
-  </p:cSld>
-  <p:clrMapOvr>
-    <a:masterClrMapping/>
-  </p:clrMapOvr>
-</p:notes>
-</file>
-
-<file path=ppt/notesSlides/notesSlide17.xml><?xml version="1.0" encoding="utf-8"?>
-<p:notes xmlns:a="http://schemas.openxmlformats.org/drawingml/2006/main" xmlns:r="http://schemas.openxmlformats.org/officeDocument/2006/relationships" xmlns:p="http://schemas.openxmlformats.org/presentationml/2006/main">
-  <p:cSld>
-    <p:spTree>
-      <p:nvGrpSpPr>
-        <p:cNvPr id="1" name=""/>
-        <p:cNvGrpSpPr/>
-        <p:nvPr/>
-      </p:nvGrpSpPr>
-      <p:grpSpPr>
-        <a:xfrm>
-          <a:off x="0" y="0"/>
-          <a:ext cx="0" cy="0"/>
-          <a:chOff x="0" y="0"/>
-          <a:chExt cx="0" cy="0"/>
-        </a:xfrm>
-      </p:grpSpPr>
-      <p:sp>
-        <p:nvSpPr>
-          <p:cNvPr id="2" name="Slide Image Placeholder 1"/>
-          <p:cNvSpPr>
-            <a:spLocks noGrp="1" noRot="1" noChangeAspect="1"/>
-          </p:cNvSpPr>
-          <p:nvPr>
-            <p:ph type="sldImg"/>
-          </p:nvPr>
-        </p:nvSpPr>
-        <p:spPr>
-          <a:xfrm>
-            <a:off x="685800" y="1143000"/>
-            <a:ext cx="5486400" cy="3086100"/>
-          </a:xfrm>
-          <a:prstGeom prst="rect">
-            <a:avLst/>
-          </a:prstGeom>
-        </p:spPr>
-      </p:sp>
-      <p:sp>
-        <p:nvSpPr>
-          <p:cNvPr id="3" name="Notes Placeholder 2"/>
-          <p:cNvSpPr>
-            <a:spLocks noGrp="1"/>
-          </p:cNvSpPr>
-          <p:nvPr>
-            <p:ph type="body" idx="1"/>
-          </p:nvPr>
-        </p:nvSpPr>
-        <p:spPr>
-          <a:xfrm>
-            <a:off x="685800" y="4400550"/>
-            <a:ext cx="5486400" cy="3600450"/>
-          </a:xfrm>
-          <a:prstGeom prst="rect">
-            <a:avLst/>
-          </a:prstGeom>
-        </p:spPr>
-        <p:txBody>
-          <a:bodyPr/>
-          <a:lstStyle/>
-          <a:p>
-            <a:endParaRPr lang="en-US"/>
-          </a:p>
-        </p:txBody>
-      </p:sp>
-      <p:sp>
-        <p:nvSpPr>
-          <p:cNvPr id="4" name="Slide Number Placeholder 3"/>
-          <p:cNvSpPr>
-            <a:spLocks noGrp="1"/>
-          </p:cNvSpPr>
-          <p:nvPr>
-            <p:ph type="sldNum" sz="quarter" idx="5"/>
-          </p:nvPr>
-        </p:nvSpPr>
-        <p:spPr>
-          <a:xfrm>
-            <a:off x="3884613" y="8685213"/>
-            <a:ext cx="2971800" cy="458787"/>
-          </a:xfrm>
-          <a:prstGeom prst="rect">
-            <a:avLst/>
-          </a:prstGeom>
-        </p:spPr>
-        <p:txBody>
-          <a:bodyPr/>
-          <a:lstStyle/>
-          <a:p>
-            <a:fld id="{017105BD-6D6F-49DB-9DE4-D4A6452D7E5F}" type="slidenum">
-              <a:rPr lang="en-US" altLang="zh-CN" noProof="0" smtClean="0"/>
-              <a:t>17</a:t>
-            </a:fld>
-            <a:endParaRPr lang="en-US" altLang="zh-CN" noProof="0" dirty="0"/>
-          </a:p>
-        </p:txBody>
-      </p:sp>
-    </p:spTree>
-    <p:extLst>
-      <p:ext uri="{BB962C8B-B14F-4D97-AF65-F5344CB8AC3E}">
-        <p14:creationId xmlns:p14="http://schemas.microsoft.com/office/powerpoint/2010/main" val="1889056454"/>
-      </p:ext>
-    </p:extLst>
-  </p:cSld>
-  <p:clrMapOvr>
-    <a:masterClrMapping/>
-  </p:clrMapOvr>
-</p:notes>
-</file>
-
-<file path=ppt/notesSlides/notesSlide18.xml><?xml version="1.0" encoding="utf-8"?>
-<p:notes xmlns:a="http://schemas.openxmlformats.org/drawingml/2006/main" xmlns:r="http://schemas.openxmlformats.org/officeDocument/2006/relationships" xmlns:p="http://schemas.openxmlformats.org/presentationml/2006/main">
-  <p:cSld>
-    <p:spTree>
-      <p:nvGrpSpPr>
-        <p:cNvPr id="1" name=""/>
-        <p:cNvGrpSpPr/>
-        <p:nvPr/>
-      </p:nvGrpSpPr>
-      <p:grpSpPr>
-        <a:xfrm>
-          <a:off x="0" y="0"/>
-          <a:ext cx="0" cy="0"/>
-          <a:chOff x="0" y="0"/>
-          <a:chExt cx="0" cy="0"/>
-        </a:xfrm>
-      </p:grpSpPr>
-      <p:sp>
-        <p:nvSpPr>
-          <p:cNvPr id="2" name="Slide Image Placeholder 1"/>
-          <p:cNvSpPr>
-            <a:spLocks noGrp="1" noRot="1" noChangeAspect="1"/>
-          </p:cNvSpPr>
-          <p:nvPr>
-            <p:ph type="sldImg"/>
-          </p:nvPr>
-        </p:nvSpPr>
-        <p:spPr>
-          <a:xfrm>
-            <a:off x="685800" y="1143000"/>
-            <a:ext cx="5486400" cy="3086100"/>
-          </a:xfrm>
-          <a:prstGeom prst="rect">
-            <a:avLst/>
-          </a:prstGeom>
-        </p:spPr>
-      </p:sp>
-      <p:sp>
-        <p:nvSpPr>
-          <p:cNvPr id="3" name="Notes Placeholder 2"/>
-          <p:cNvSpPr>
-            <a:spLocks noGrp="1"/>
-          </p:cNvSpPr>
-          <p:nvPr>
-            <p:ph type="body" idx="1"/>
-          </p:nvPr>
-        </p:nvSpPr>
-        <p:spPr>
-          <a:xfrm>
-            <a:off x="685800" y="4400550"/>
-            <a:ext cx="5486400" cy="3600450"/>
-          </a:xfrm>
-          <a:prstGeom prst="rect">
-            <a:avLst/>
-          </a:prstGeom>
-        </p:spPr>
-        <p:txBody>
-          <a:bodyPr/>
-          <a:lstStyle/>
-          <a:p>
-            <a:endParaRPr lang="en-US"/>
-          </a:p>
-        </p:txBody>
-      </p:sp>
-      <p:sp>
-        <p:nvSpPr>
-          <p:cNvPr id="4" name="Slide Number Placeholder 3"/>
-          <p:cNvSpPr>
-            <a:spLocks noGrp="1"/>
-          </p:cNvSpPr>
-          <p:nvPr>
-            <p:ph type="sldNum" sz="quarter" idx="5"/>
-          </p:nvPr>
-        </p:nvSpPr>
-        <p:spPr>
-          <a:xfrm>
-            <a:off x="3884613" y="8685213"/>
-            <a:ext cx="2971800" cy="458787"/>
-          </a:xfrm>
-          <a:prstGeom prst="rect">
-            <a:avLst/>
-          </a:prstGeom>
-        </p:spPr>
-        <p:txBody>
-          <a:bodyPr/>
-          <a:lstStyle/>
-          <a:p>
-            <a:fld id="{017105BD-6D6F-49DB-9DE4-D4A6452D7E5F}" type="slidenum">
-              <a:rPr lang="en-US" altLang="zh-CN" noProof="0" smtClean="0"/>
-              <a:t>18</a:t>
             </a:fld>
             <a:endParaRPr lang="en-US" altLang="zh-CN" noProof="0" dirty="0"/>
           </a:p>
@@ -15607,7 +15565,7 @@
           <a:p>
             <a:fld id="{627ED9C8-F09A-4D9E-BEC0-4725162E21FF}" type="datetimeFigureOut">
               <a:rPr lang="en-US" smtClean="0"/>
-              <a:t>10/1/2024</a:t>
+              <a:t>10/2/2024</a:t>
             </a:fld>
             <a:endParaRPr lang="en-US"/>
           </a:p>
@@ -25444,10 +25402,10 @@
       </p:grpSpPr>
       <p:sp>
         <p:nvSpPr>
-          <p:cNvPr id="56" name="Title 55">
-            <a:extLst>
-              <a:ext uri="{FF2B5EF4-FFF2-40B4-BE49-F238E27FC236}">
-                <a16:creationId xmlns:a16="http://schemas.microsoft.com/office/drawing/2014/main" id="{19576725-5FD5-0E5D-4FD3-2E35020D8306}"/>
+          <p:cNvPr id="46" name="Title 45">
+            <a:extLst>
+              <a:ext uri="{FF2B5EF4-FFF2-40B4-BE49-F238E27FC236}">
+                <a16:creationId xmlns:a16="http://schemas.microsoft.com/office/drawing/2014/main" id="{4D761329-3BEF-0173-1328-A4DB26572AFF}"/>
               </a:ext>
             </a:extLst>
           </p:cNvPr>
@@ -25458,197 +25416,89 @@
             <p:ph type="title"/>
           </p:nvPr>
         </p:nvSpPr>
-        <p:spPr>
-          <a:xfrm>
-            <a:off x="2322561" y="137564"/>
-            <a:ext cx="7724550" cy="584925"/>
-          </a:xfrm>
-        </p:spPr>
+        <p:spPr/>
         <p:txBody>
           <a:bodyPr/>
           <a:lstStyle/>
           <a:p>
-            <a:pPr algn="ctr"/>
             <a:r>
-              <a:rPr lang="en-US" sz="2400" dirty="0"/>
-              <a:t>Influence of Information Sources by Demographics</a:t>
+              <a:rPr lang="en-US" dirty="0"/>
+              <a:t>Implications for Stakeholders</a:t>
             </a:r>
-            <a:endParaRPr lang="en-US" sz="5400" dirty="0"/>
-          </a:p>
-        </p:txBody>
-      </p:sp>
-      <p:sp>
-        <p:nvSpPr>
-          <p:cNvPr id="79" name="Title 45">
-            <a:extLst>
-              <a:ext uri="{FF2B5EF4-FFF2-40B4-BE49-F238E27FC236}">
-                <a16:creationId xmlns:a16="http://schemas.microsoft.com/office/drawing/2014/main" id="{BF56133F-129A-4FD7-A24F-C9E828DCA9D4}"/>
-              </a:ext>
-            </a:extLst>
-          </p:cNvPr>
-          <p:cNvSpPr txBox="1">
-            <a:spLocks/>
+          </a:p>
+        </p:txBody>
+      </p:sp>
+      <p:sp>
+        <p:nvSpPr>
+          <p:cNvPr id="19" name="Text Placeholder 18">
+            <a:extLst>
+              <a:ext uri="{FF2B5EF4-FFF2-40B4-BE49-F238E27FC236}">
+                <a16:creationId xmlns:a16="http://schemas.microsoft.com/office/drawing/2014/main" id="{FC101F03-8617-09D4-619B-F38E2F0A4F15}"/>
+              </a:ext>
+            </a:extLst>
+          </p:cNvPr>
+          <p:cNvSpPr>
+            <a:spLocks noGrp="1"/>
           </p:cNvSpPr>
-          <p:nvPr/>
-        </p:nvSpPr>
-        <p:spPr>
-          <a:xfrm>
-            <a:off x="408252" y="916594"/>
-            <a:ext cx="3643683" cy="755313"/>
-          </a:xfrm>
-          <a:prstGeom prst="rect">
-            <a:avLst/>
-          </a:prstGeom>
-        </p:spPr>
-        <p:txBody>
-          <a:bodyPr vert="horz" lIns="91440" tIns="45720" rIns="91440" bIns="45720" rtlCol="0" anchor="t">
-            <a:noAutofit/>
-          </a:bodyPr>
-          <a:lstStyle>
-            <a:lvl1pPr algn="l" defTabSz="914400" rtl="0" eaLnBrk="1" latinLnBrk="0" hangingPunct="1">
-              <a:lnSpc>
-                <a:spcPct val="90000"/>
-              </a:lnSpc>
-              <a:spcBef>
-                <a:spcPct val="0"/>
-              </a:spcBef>
-              <a:buNone/>
-              <a:defRPr sz="4400" b="1" kern="1200">
-                <a:solidFill>
-                  <a:schemeClr val="accent6"/>
-                </a:solidFill>
-                <a:latin typeface="+mj-lt"/>
-                <a:ea typeface="+mj-ea"/>
-                <a:cs typeface="+mj-cs"/>
-              </a:defRPr>
-            </a:lvl1pPr>
-          </a:lstStyle>
+          <p:nvPr>
+            <p:ph type="body" sz="quarter" idx="28"/>
+          </p:nvPr>
+        </p:nvSpPr>
+        <p:spPr/>
+        <p:txBody>
+          <a:bodyPr/>
+          <a:lstStyle/>
           <a:p>
             <a:r>
-              <a:rPr lang="en-US" sz="2400" dirty="0"/>
-              <a:t>Married</a:t>
+              <a:rPr lang="en-US" dirty="0"/>
+              <a:t>ANNUAL REVENUE GROWTH</a:t>
             </a:r>
+          </a:p>
+          <a:p>
+            <a:endParaRPr lang="en-US" dirty="0"/>
           </a:p>
         </p:txBody>
       </p:sp>
       <p:pic>
         <p:nvPicPr>
-          <p:cNvPr id="3" name="Picture 2">
-            <a:extLst>
-              <a:ext uri="{FF2B5EF4-FFF2-40B4-BE49-F238E27FC236}">
-                <a16:creationId xmlns:a16="http://schemas.microsoft.com/office/drawing/2014/main" id="{461A984B-4338-484B-8344-1C9B1A6E5508}"/>
+          <p:cNvPr id="48" name="Picture placeholder 19" descr="Layout of website design sketches on white paper">
+            <a:extLst>
+              <a:ext uri="{FF2B5EF4-FFF2-40B4-BE49-F238E27FC236}">
+                <a16:creationId xmlns:a16="http://schemas.microsoft.com/office/drawing/2014/main" id="{6D25AB81-B10A-BD11-E8FE-ECF8CB1B12F0}"/>
               </a:ext>
             </a:extLst>
           </p:cNvPr>
           <p:cNvPicPr>
-            <a:picLocks noChangeAspect="1"/>
+            <a:picLocks noGrp="1" noChangeAspect="1"/>
           </p:cNvPicPr>
-          <p:nvPr/>
+          <p:nvPr>
+            <p:ph type="pic" sz="quarter" idx="47"/>
+          </p:nvPr>
         </p:nvPicPr>
         <p:blipFill>
-          <a:blip r:embed="rId3"/>
-          <a:stretch>
-            <a:fillRect/>
-          </a:stretch>
+          <a:blip r:embed="rId3">
+            <a:extLst>
+              <a:ext uri="{28A0092B-C50C-407E-A947-70E740481C1C}">
+                <a14:useLocalDpi xmlns:a14="http://schemas.microsoft.com/office/drawing/2010/main"/>
+              </a:ext>
+            </a:extLst>
+          </a:blip>
+          <a:srcRect/>
+          <a:stretch/>
         </p:blipFill>
         <p:spPr>
-          <a:xfrm>
-            <a:off x="3381177" y="627133"/>
-            <a:ext cx="7578237" cy="3061290"/>
-          </a:xfrm>
-          <a:prstGeom prst="rect">
-            <a:avLst/>
-          </a:prstGeom>
+          <a:blipFill>
+            <a:blip r:embed="rId4"/>
+            <a:stretch>
+              <a:fillRect/>
+            </a:stretch>
+          </a:blipFill>
         </p:spPr>
       </p:pic>
-      <p:pic>
-        <p:nvPicPr>
-          <p:cNvPr id="7" name="Picture 6">
-            <a:extLst>
-              <a:ext uri="{FF2B5EF4-FFF2-40B4-BE49-F238E27FC236}">
-                <a16:creationId xmlns:a16="http://schemas.microsoft.com/office/drawing/2014/main" id="{882F79DA-EA77-4269-8B1D-00D5B17E438A}"/>
-              </a:ext>
-            </a:extLst>
-          </p:cNvPr>
-          <p:cNvPicPr>
-            <a:picLocks noChangeAspect="1"/>
-          </p:cNvPicPr>
-          <p:nvPr/>
-        </p:nvPicPr>
-        <p:blipFill>
-          <a:blip r:embed="rId4"/>
-          <a:stretch>
-            <a:fillRect/>
-          </a:stretch>
-        </p:blipFill>
-        <p:spPr>
-          <a:xfrm>
-            <a:off x="3381177" y="3806577"/>
-            <a:ext cx="7578237" cy="2983488"/>
-          </a:xfrm>
-          <a:prstGeom prst="rect">
-            <a:avLst/>
-          </a:prstGeom>
-        </p:spPr>
-      </p:pic>
-      <p:sp>
-        <p:nvSpPr>
-          <p:cNvPr id="10" name="Title 45">
-            <a:extLst>
-              <a:ext uri="{FF2B5EF4-FFF2-40B4-BE49-F238E27FC236}">
-                <a16:creationId xmlns:a16="http://schemas.microsoft.com/office/drawing/2014/main" id="{FB76D41F-5ECB-4932-8035-6200F62EF02D}"/>
-              </a:ext>
-            </a:extLst>
-          </p:cNvPr>
-          <p:cNvSpPr txBox="1">
-            <a:spLocks/>
-          </p:cNvSpPr>
-          <p:nvPr/>
-        </p:nvSpPr>
-        <p:spPr>
-          <a:xfrm>
-            <a:off x="408252" y="4394765"/>
-            <a:ext cx="3643683" cy="755313"/>
-          </a:xfrm>
-          <a:prstGeom prst="rect">
-            <a:avLst/>
-          </a:prstGeom>
-        </p:spPr>
-        <p:txBody>
-          <a:bodyPr vert="horz" lIns="91440" tIns="45720" rIns="91440" bIns="45720" rtlCol="0" anchor="t">
-            <a:noAutofit/>
-          </a:bodyPr>
-          <a:lstStyle>
-            <a:lvl1pPr algn="l" defTabSz="914400" rtl="0" eaLnBrk="1" latinLnBrk="0" hangingPunct="1">
-              <a:lnSpc>
-                <a:spcPct val="90000"/>
-              </a:lnSpc>
-              <a:spcBef>
-                <a:spcPct val="0"/>
-              </a:spcBef>
-              <a:buNone/>
-              <a:defRPr sz="4400" b="1" kern="1200">
-                <a:solidFill>
-                  <a:schemeClr val="accent6"/>
-                </a:solidFill>
-                <a:latin typeface="+mj-lt"/>
-                <a:ea typeface="+mj-ea"/>
-                <a:cs typeface="+mj-cs"/>
-              </a:defRPr>
-            </a:lvl1pPr>
-          </a:lstStyle>
-          <a:p>
-            <a:r>
-              <a:rPr lang="en-US" sz="2400" dirty="0"/>
-              <a:t>Not Married</a:t>
-            </a:r>
-          </a:p>
-        </p:txBody>
-      </p:sp>
     </p:spTree>
     <p:extLst>
       <p:ext uri="{BB962C8B-B14F-4D97-AF65-F5344CB8AC3E}">
-        <p14:creationId xmlns:p14="http://schemas.microsoft.com/office/powerpoint/2010/main" val="1939385481"/>
+        <p14:creationId xmlns:p14="http://schemas.microsoft.com/office/powerpoint/2010/main" val="474433727"/>
       </p:ext>
     </p:extLst>
   </p:cSld>
@@ -25677,10 +25527,10 @@
       </p:grpSpPr>
       <p:sp>
         <p:nvSpPr>
-          <p:cNvPr id="56" name="Title 55">
-            <a:extLst>
-              <a:ext uri="{FF2B5EF4-FFF2-40B4-BE49-F238E27FC236}">
-                <a16:creationId xmlns:a16="http://schemas.microsoft.com/office/drawing/2014/main" id="{19576725-5FD5-0E5D-4FD3-2E35020D8306}"/>
+          <p:cNvPr id="86" name="Title 85">
+            <a:extLst>
+              <a:ext uri="{FF2B5EF4-FFF2-40B4-BE49-F238E27FC236}">
+                <a16:creationId xmlns:a16="http://schemas.microsoft.com/office/drawing/2014/main" id="{1E3F7726-AC85-55B8-BDED-51E7BA85CD1C}"/>
               </a:ext>
             </a:extLst>
           </p:cNvPr>
@@ -25693,195 +25543,283 @@
         </p:nvSpPr>
         <p:spPr>
           <a:xfrm>
-            <a:off x="2322561" y="137564"/>
-            <a:ext cx="7724550" cy="584925"/>
+            <a:off x="853575" y="25966"/>
+            <a:ext cx="10515600" cy="854075"/>
           </a:xfrm>
         </p:spPr>
         <p:txBody>
           <a:bodyPr/>
           <a:lstStyle/>
           <a:p>
-            <a:pPr algn="ctr"/>
             <a:r>
-              <a:rPr lang="en-US" sz="2400" dirty="0"/>
-              <a:t>Influence of Information Sources by Demographics</a:t>
+              <a:rPr lang="en-US" dirty="0"/>
+              <a:t>Action</a:t>
             </a:r>
-            <a:endParaRPr lang="en-US" sz="5400" dirty="0"/>
-          </a:p>
-        </p:txBody>
-      </p:sp>
-      <p:sp>
-        <p:nvSpPr>
-          <p:cNvPr id="79" name="Title 45">
-            <a:extLst>
-              <a:ext uri="{FF2B5EF4-FFF2-40B4-BE49-F238E27FC236}">
-                <a16:creationId xmlns:a16="http://schemas.microsoft.com/office/drawing/2014/main" id="{BF56133F-129A-4FD7-A24F-C9E828DCA9D4}"/>
-              </a:ext>
-            </a:extLst>
-          </p:cNvPr>
-          <p:cNvSpPr txBox="1">
-            <a:spLocks/>
+          </a:p>
+        </p:txBody>
+      </p:sp>
+      <p:sp>
+        <p:nvSpPr>
+          <p:cNvPr id="29" name="Text Placeholder">
+            <a:extLst>
+              <a:ext uri="{FF2B5EF4-FFF2-40B4-BE49-F238E27FC236}">
+                <a16:creationId xmlns:a16="http://schemas.microsoft.com/office/drawing/2014/main" id="{0490F6D4-84D0-42DF-A807-E56706B577D6}"/>
+              </a:ext>
+            </a:extLst>
+          </p:cNvPr>
+          <p:cNvSpPr>
+            <a:spLocks noGrp="1"/>
           </p:cNvSpPr>
-          <p:nvPr/>
+          <p:nvPr>
+            <p:ph type="body" sz="quarter" idx="27"/>
+          </p:nvPr>
         </p:nvSpPr>
         <p:spPr>
           <a:xfrm>
-            <a:off x="163589" y="896543"/>
-            <a:ext cx="2559063" cy="755313"/>
+            <a:off x="3109346" y="4035534"/>
+            <a:ext cx="1877575" cy="972197"/>
           </a:xfrm>
-          <a:prstGeom prst="rect">
-            <a:avLst/>
-          </a:prstGeom>
         </p:spPr>
         <p:txBody>
-          <a:bodyPr vert="horz" lIns="91440" tIns="45720" rIns="91440" bIns="45720" rtlCol="0" anchor="t">
-            <a:noAutofit/>
-          </a:bodyPr>
-          <a:lstStyle>
-            <a:lvl1pPr algn="l" defTabSz="914400" rtl="0" eaLnBrk="1" latinLnBrk="0" hangingPunct="1">
-              <a:lnSpc>
-                <a:spcPct val="90000"/>
-              </a:lnSpc>
-              <a:spcBef>
-                <a:spcPct val="0"/>
-              </a:spcBef>
-              <a:buNone/>
-              <a:defRPr sz="4400" b="1" kern="1200">
-                <a:solidFill>
-                  <a:schemeClr val="accent6"/>
-                </a:solidFill>
-                <a:latin typeface="+mj-lt"/>
-                <a:ea typeface="+mj-ea"/>
-                <a:cs typeface="+mj-cs"/>
-              </a:defRPr>
-            </a:lvl1pPr>
-          </a:lstStyle>
+          <a:bodyPr/>
+          <a:lstStyle/>
           <a:p>
             <a:r>
-              <a:rPr lang="en-US" sz="2400" dirty="0"/>
-              <a:t>Income Range: $40k - $70k</a:t>
+              <a:rPr lang="en-US" dirty="0"/>
+              <a:t>Channel Optimization</a:t>
             </a:r>
+            <a:endParaRPr lang="zh-CN" altLang="en-US" dirty="0"/>
           </a:p>
         </p:txBody>
       </p:sp>
       <p:pic>
         <p:nvPicPr>
-          <p:cNvPr id="4" name="Picture 3">
-            <a:extLst>
-              <a:ext uri="{FF2B5EF4-FFF2-40B4-BE49-F238E27FC236}">
-                <a16:creationId xmlns:a16="http://schemas.microsoft.com/office/drawing/2014/main" id="{09D160CB-4973-49D9-AAF1-E4809FC503F7}"/>
+          <p:cNvPr id="10" name="Picture Placeholder 9" descr="People working in office">
+            <a:extLst>
+              <a:ext uri="{FF2B5EF4-FFF2-40B4-BE49-F238E27FC236}">
+                <a16:creationId xmlns:a16="http://schemas.microsoft.com/office/drawing/2014/main" id="{D249D9CF-86A2-4E7B-8B6F-D02EE968C997}"/>
               </a:ext>
             </a:extLst>
           </p:cNvPr>
           <p:cNvPicPr>
-            <a:picLocks noChangeAspect="1"/>
+            <a:picLocks noGrp="1" noChangeAspect="1"/>
           </p:cNvPicPr>
-          <p:nvPr/>
+          <p:nvPr>
+            <p:ph type="pic" sz="quarter" idx="58"/>
+          </p:nvPr>
         </p:nvPicPr>
         <p:blipFill>
-          <a:blip r:embed="rId3"/>
+          <a:blip r:embed="rId3" cstate="print">
+            <a:extLst>
+              <a:ext uri="{28A0092B-C50C-407E-A947-70E740481C1C}">
+                <a14:useLocalDpi xmlns:a14="http://schemas.microsoft.com/office/drawing/2010/main"/>
+              </a:ext>
+            </a:extLst>
+          </a:blip>
+          <a:srcRect/>
+          <a:stretch>
+            <a:fillRect/>
+          </a:stretch>
+        </p:blipFill>
+        <p:spPr/>
+      </p:pic>
+      <p:sp>
+        <p:nvSpPr>
+          <p:cNvPr id="37" name="Text Placeholder">
+            <a:extLst>
+              <a:ext uri="{FF2B5EF4-FFF2-40B4-BE49-F238E27FC236}">
+                <a16:creationId xmlns:a16="http://schemas.microsoft.com/office/drawing/2014/main" id="{3A30B02E-FBE1-41C5-AF6E-E1013275E84A}"/>
+              </a:ext>
+            </a:extLst>
+          </p:cNvPr>
+          <p:cNvSpPr>
+            <a:spLocks noGrp="1"/>
+          </p:cNvSpPr>
+          <p:nvPr>
+            <p:ph type="body" sz="quarter" idx="49"/>
+          </p:nvPr>
+        </p:nvSpPr>
+        <p:spPr>
+          <a:xfrm>
+            <a:off x="7205081" y="4035534"/>
+            <a:ext cx="1877575" cy="665169"/>
+          </a:xfrm>
+        </p:spPr>
+        <p:txBody>
+          <a:bodyPr/>
+          <a:lstStyle/>
+          <a:p>
+            <a:r>
+              <a:rPr lang="en-US" dirty="0"/>
+              <a:t>Developing Targeted Campaigns</a:t>
+            </a:r>
+            <a:endParaRPr lang="zh-CN" altLang="en-US" dirty="0"/>
+          </a:p>
+        </p:txBody>
+      </p:sp>
+      <p:pic>
+        <p:nvPicPr>
+          <p:cNvPr id="12" name="Picture Placeholder 11" descr="Layout of website design sketches on white paper">
+            <a:extLst>
+              <a:ext uri="{FF2B5EF4-FFF2-40B4-BE49-F238E27FC236}">
+                <a16:creationId xmlns:a16="http://schemas.microsoft.com/office/drawing/2014/main" id="{3D51D04D-653C-45AE-9DDF-BE96BA267A6B}"/>
+              </a:ext>
+            </a:extLst>
+          </p:cNvPr>
+          <p:cNvPicPr>
+            <a:picLocks noGrp="1" noChangeAspect="1"/>
+          </p:cNvPicPr>
+          <p:nvPr>
+            <p:ph type="pic" sz="quarter" idx="59"/>
+          </p:nvPr>
+        </p:nvPicPr>
+        <p:blipFill>
+          <a:blip r:embed="rId4" cstate="print">
+            <a:extLst>
+              <a:ext uri="{28A0092B-C50C-407E-A947-70E740481C1C}">
+                <a14:useLocalDpi xmlns:a14="http://schemas.microsoft.com/office/drawing/2010/main"/>
+              </a:ext>
+            </a:extLst>
+          </a:blip>
+          <a:srcRect/>
+          <a:stretch>
+            <a:fillRect/>
+          </a:stretch>
+        </p:blipFill>
+        <p:spPr/>
+      </p:pic>
+      <p:sp>
+        <p:nvSpPr>
+          <p:cNvPr id="40" name="Text Placeholder">
+            <a:extLst>
+              <a:ext uri="{FF2B5EF4-FFF2-40B4-BE49-F238E27FC236}">
+                <a16:creationId xmlns:a16="http://schemas.microsoft.com/office/drawing/2014/main" id="{17095E6E-F279-4342-B53E-E53B820336B3}"/>
+              </a:ext>
+            </a:extLst>
+          </p:cNvPr>
+          <p:cNvSpPr>
+            <a:spLocks noGrp="1"/>
+          </p:cNvSpPr>
+          <p:nvPr>
+            <p:ph type="body" sz="quarter" idx="52"/>
+          </p:nvPr>
+        </p:nvSpPr>
+        <p:spPr>
+          <a:xfrm>
+            <a:off x="5164755" y="1135844"/>
+            <a:ext cx="1691687" cy="811178"/>
+          </a:xfrm>
+        </p:spPr>
+        <p:txBody>
+          <a:bodyPr/>
+          <a:lstStyle/>
+          <a:p>
+            <a:pPr>
+              <a:spcBef>
+                <a:spcPts val="1000"/>
+              </a:spcBef>
+            </a:pPr>
+            <a:r>
+              <a:rPr lang="en-US" sz="1800" b="1" dirty="0">
+                <a:ea typeface="+mn-ea"/>
+                <a:cs typeface="+mn-cs"/>
+              </a:rPr>
+              <a:t>Influencer and Referral Programs</a:t>
+            </a:r>
+            <a:endParaRPr lang="en-US" altLang="zh-CN" sz="1800" b="1" dirty="0">
+              <a:ea typeface="+mn-ea"/>
+              <a:cs typeface="+mn-cs"/>
+            </a:endParaRPr>
+          </a:p>
+        </p:txBody>
+      </p:sp>
+      <p:pic>
+        <p:nvPicPr>
+          <p:cNvPr id="14" name="Picture Placeholder 13" descr="Empty office chairs">
+            <a:extLst>
+              <a:ext uri="{FF2B5EF4-FFF2-40B4-BE49-F238E27FC236}">
+                <a16:creationId xmlns:a16="http://schemas.microsoft.com/office/drawing/2014/main" id="{33C59A08-3A06-4556-AC83-C1337E73D0B3}"/>
+              </a:ext>
+            </a:extLst>
+          </p:cNvPr>
+          <p:cNvPicPr>
+            <a:picLocks noGrp="1" noChangeAspect="1"/>
+          </p:cNvPicPr>
+          <p:nvPr>
+            <p:ph type="pic" sz="quarter" idx="60"/>
+          </p:nvPr>
+        </p:nvPicPr>
+        <p:blipFill>
+          <a:blip r:embed="rId5" cstate="print">
+            <a:extLst>
+              <a:ext uri="{28A0092B-C50C-407E-A947-70E740481C1C}">
+                <a14:useLocalDpi xmlns:a14="http://schemas.microsoft.com/office/drawing/2010/main"/>
+              </a:ext>
+            </a:extLst>
+          </a:blip>
+          <a:srcRect/>
           <a:stretch>
             <a:fillRect/>
           </a:stretch>
         </p:blipFill>
         <p:spPr>
           <a:xfrm>
-            <a:off x="3426388" y="537556"/>
-            <a:ext cx="7392299" cy="2991302"/>
+            <a:off x="7361472" y="2073439"/>
+            <a:ext cx="1621032" cy="1841551"/>
           </a:xfrm>
-          <a:prstGeom prst="rect">
-            <a:avLst/>
-          </a:prstGeom>
         </p:spPr>
       </p:pic>
-      <p:pic>
-        <p:nvPicPr>
-          <p:cNvPr id="7" name="Picture 6">
-            <a:extLst>
-              <a:ext uri="{FF2B5EF4-FFF2-40B4-BE49-F238E27FC236}">
-                <a16:creationId xmlns:a16="http://schemas.microsoft.com/office/drawing/2014/main" id="{C6F2A308-8F25-4624-A368-949A8B66E1EF}"/>
-              </a:ext>
-            </a:extLst>
-          </p:cNvPr>
-          <p:cNvPicPr>
-            <a:picLocks noChangeAspect="1"/>
-          </p:cNvPicPr>
-          <p:nvPr/>
-        </p:nvPicPr>
-        <p:blipFill>
-          <a:blip r:embed="rId4"/>
-          <a:stretch>
-            <a:fillRect/>
-          </a:stretch>
-        </p:blipFill>
-        <p:spPr>
-          <a:xfrm>
-            <a:off x="3426388" y="3542838"/>
-            <a:ext cx="7478212" cy="3040208"/>
-          </a:xfrm>
-          <a:prstGeom prst="rect">
-            <a:avLst/>
-          </a:prstGeom>
-        </p:spPr>
-      </p:pic>
-      <p:sp>
-        <p:nvSpPr>
-          <p:cNvPr id="10" name="Title 45">
-            <a:extLst>
-              <a:ext uri="{FF2B5EF4-FFF2-40B4-BE49-F238E27FC236}">
-                <a16:creationId xmlns:a16="http://schemas.microsoft.com/office/drawing/2014/main" id="{19F408C8-EC74-4F83-A48B-11E030072CD2}"/>
-              </a:ext>
-            </a:extLst>
-          </p:cNvPr>
-          <p:cNvSpPr txBox="1">
-            <a:spLocks/>
+      <p:sp>
+        <p:nvSpPr>
+          <p:cNvPr id="4" name="Footer Placeholder 3">
+            <a:extLst>
+              <a:ext uri="{FF2B5EF4-FFF2-40B4-BE49-F238E27FC236}">
+                <a16:creationId xmlns:a16="http://schemas.microsoft.com/office/drawing/2014/main" id="{695DA9C9-8185-D0AB-3C76-BC1CABABA354}"/>
+              </a:ext>
+            </a:extLst>
+          </p:cNvPr>
+          <p:cNvSpPr>
+            <a:spLocks noGrp="1"/>
           </p:cNvSpPr>
-          <p:nvPr/>
-        </p:nvSpPr>
-        <p:spPr>
-          <a:xfrm>
-            <a:off x="163589" y="4313907"/>
-            <a:ext cx="2559063" cy="755313"/>
-          </a:xfrm>
-          <a:prstGeom prst="rect">
-            <a:avLst/>
-          </a:prstGeom>
-        </p:spPr>
-        <p:txBody>
-          <a:bodyPr vert="horz" lIns="91440" tIns="45720" rIns="91440" bIns="45720" rtlCol="0" anchor="t">
-            <a:noAutofit/>
-          </a:bodyPr>
-          <a:lstStyle>
-            <a:lvl1pPr algn="l" defTabSz="914400" rtl="0" eaLnBrk="1" latinLnBrk="0" hangingPunct="1">
-              <a:lnSpc>
-                <a:spcPct val="90000"/>
-              </a:lnSpc>
-              <a:spcBef>
-                <a:spcPct val="0"/>
-              </a:spcBef>
-              <a:buNone/>
-              <a:defRPr sz="4400" b="1" kern="1200">
-                <a:solidFill>
-                  <a:schemeClr val="accent6"/>
-                </a:solidFill>
-                <a:latin typeface="+mj-lt"/>
-                <a:ea typeface="+mj-ea"/>
-                <a:cs typeface="+mj-cs"/>
-              </a:defRPr>
-            </a:lvl1pPr>
-          </a:lstStyle>
+          <p:nvPr>
+            <p:ph type="ftr" sz="quarter" idx="62"/>
+          </p:nvPr>
+        </p:nvSpPr>
+        <p:spPr/>
+        <p:txBody>
+          <a:bodyPr/>
+          <a:lstStyle/>
           <a:p>
             <a:r>
-              <a:rPr lang="en-US" sz="2400" dirty="0"/>
-              <a:t>Income Range: $130k - $160k</a:t>
+              <a:rPr lang="en-US"/>
+              <a:t>Presentation title</a:t>
             </a:r>
-          </a:p>
-        </p:txBody>
+            <a:endParaRPr lang="en-US" dirty="0"/>
+          </a:p>
+        </p:txBody>
+      </p:sp>
+      <p:sp>
+        <p:nvSpPr>
+          <p:cNvPr id="13" name="Picture Placeholder 12">
+            <a:extLst>
+              <a:ext uri="{FF2B5EF4-FFF2-40B4-BE49-F238E27FC236}">
+                <a16:creationId xmlns:a16="http://schemas.microsoft.com/office/drawing/2014/main" id="{E9FBBAB6-B92D-477A-BB2D-922C57FEB07D}"/>
+              </a:ext>
+            </a:extLst>
+          </p:cNvPr>
+          <p:cNvSpPr>
+            <a:spLocks noGrp="1"/>
+          </p:cNvSpPr>
+          <p:nvPr>
+            <p:ph type="pic" sz="quarter" idx="57"/>
+          </p:nvPr>
+        </p:nvSpPr>
+        <p:spPr/>
       </p:sp>
     </p:spTree>
     <p:extLst>
       <p:ext uri="{BB962C8B-B14F-4D97-AF65-F5344CB8AC3E}">
-        <p14:creationId xmlns:p14="http://schemas.microsoft.com/office/powerpoint/2010/main" val="425780015"/>
+        <p14:creationId xmlns:p14="http://schemas.microsoft.com/office/powerpoint/2010/main" val="2517140333"/>
       </p:ext>
     </p:extLst>
   </p:cSld>
@@ -25931,7 +25869,7 @@
           <a:p>
             <a:r>
               <a:rPr lang="en-US" dirty="0"/>
-              <a:t>Implications for Stakeholders</a:t>
+              <a:t>Ethical, legal, societal implications</a:t>
             </a:r>
           </a:p>
         </p:txBody>
@@ -26006,7 +25944,7 @@
     </p:spTree>
     <p:extLst>
       <p:ext uri="{BB962C8B-B14F-4D97-AF65-F5344CB8AC3E}">
-        <p14:creationId xmlns:p14="http://schemas.microsoft.com/office/powerpoint/2010/main" val="474433727"/>
+        <p14:creationId xmlns:p14="http://schemas.microsoft.com/office/powerpoint/2010/main" val="3386411503"/>
       </p:ext>
     </p:extLst>
   </p:cSld>
@@ -26035,557 +25973,6 @@
       </p:grpSpPr>
       <p:sp>
         <p:nvSpPr>
-          <p:cNvPr id="86" name="Title 85">
-            <a:extLst>
-              <a:ext uri="{FF2B5EF4-FFF2-40B4-BE49-F238E27FC236}">
-                <a16:creationId xmlns:a16="http://schemas.microsoft.com/office/drawing/2014/main" id="{1E3F7726-AC85-55B8-BDED-51E7BA85CD1C}"/>
-              </a:ext>
-            </a:extLst>
-          </p:cNvPr>
-          <p:cNvSpPr>
-            <a:spLocks noGrp="1"/>
-          </p:cNvSpPr>
-          <p:nvPr>
-            <p:ph type="title"/>
-          </p:nvPr>
-        </p:nvSpPr>
-        <p:spPr>
-          <a:xfrm>
-            <a:off x="853575" y="25966"/>
-            <a:ext cx="10515600" cy="854075"/>
-          </a:xfrm>
-        </p:spPr>
-        <p:txBody>
-          <a:bodyPr/>
-          <a:lstStyle/>
-          <a:p>
-            <a:r>
-              <a:rPr lang="en-US" dirty="0"/>
-              <a:t>Action</a:t>
-            </a:r>
-          </a:p>
-        </p:txBody>
-      </p:sp>
-      <p:pic>
-        <p:nvPicPr>
-          <p:cNvPr id="8" name="Picture Placeholder 7" descr="Businesswoman reviewing sticky notes on a wall">
-            <a:extLst>
-              <a:ext uri="{FF2B5EF4-FFF2-40B4-BE49-F238E27FC236}">
-                <a16:creationId xmlns:a16="http://schemas.microsoft.com/office/drawing/2014/main" id="{66D3A5E9-F687-402F-8477-EE4CD418CA67}"/>
-              </a:ext>
-            </a:extLst>
-          </p:cNvPr>
-          <p:cNvPicPr>
-            <a:picLocks noGrp="1" noChangeAspect="1"/>
-          </p:cNvPicPr>
-          <p:nvPr>
-            <p:ph type="pic" sz="quarter" idx="57"/>
-          </p:nvPr>
-        </p:nvPicPr>
-        <p:blipFill>
-          <a:blip r:embed="rId3" cstate="print">
-            <a:extLst>
-              <a:ext uri="{28A0092B-C50C-407E-A947-70E740481C1C}">
-                <a14:useLocalDpi xmlns:a14="http://schemas.microsoft.com/office/drawing/2010/main"/>
-              </a:ext>
-            </a:extLst>
-          </a:blip>
-          <a:srcRect/>
-          <a:stretch>
-            <a:fillRect/>
-          </a:stretch>
-        </p:blipFill>
-        <p:spPr/>
-      </p:pic>
-      <p:sp>
-        <p:nvSpPr>
-          <p:cNvPr id="29" name="Text Placeholder">
-            <a:extLst>
-              <a:ext uri="{FF2B5EF4-FFF2-40B4-BE49-F238E27FC236}">
-                <a16:creationId xmlns:a16="http://schemas.microsoft.com/office/drawing/2014/main" id="{0490F6D4-84D0-42DF-A807-E56706B577D6}"/>
-              </a:ext>
-            </a:extLst>
-          </p:cNvPr>
-          <p:cNvSpPr>
-            <a:spLocks noGrp="1"/>
-          </p:cNvSpPr>
-          <p:nvPr>
-            <p:ph type="body" sz="quarter" idx="27"/>
-          </p:nvPr>
-        </p:nvSpPr>
-        <p:spPr>
-          <a:xfrm>
-            <a:off x="3109346" y="4035534"/>
-            <a:ext cx="1877575" cy="972197"/>
-          </a:xfrm>
-        </p:spPr>
-        <p:txBody>
-          <a:bodyPr/>
-          <a:lstStyle/>
-          <a:p>
-            <a:r>
-              <a:rPr lang="en-US" dirty="0"/>
-              <a:t>Channel Optimization</a:t>
-            </a:r>
-            <a:endParaRPr lang="zh-CN" altLang="en-US" dirty="0"/>
-          </a:p>
-        </p:txBody>
-      </p:sp>
-      <p:pic>
-        <p:nvPicPr>
-          <p:cNvPr id="10" name="Picture Placeholder 9" descr="People working in office">
-            <a:extLst>
-              <a:ext uri="{FF2B5EF4-FFF2-40B4-BE49-F238E27FC236}">
-                <a16:creationId xmlns:a16="http://schemas.microsoft.com/office/drawing/2014/main" id="{D249D9CF-86A2-4E7B-8B6F-D02EE968C997}"/>
-              </a:ext>
-            </a:extLst>
-          </p:cNvPr>
-          <p:cNvPicPr>
-            <a:picLocks noGrp="1" noChangeAspect="1"/>
-          </p:cNvPicPr>
-          <p:nvPr>
-            <p:ph type="pic" sz="quarter" idx="58"/>
-          </p:nvPr>
-        </p:nvPicPr>
-        <p:blipFill>
-          <a:blip r:embed="rId4" cstate="print">
-            <a:extLst>
-              <a:ext uri="{28A0092B-C50C-407E-A947-70E740481C1C}">
-                <a14:useLocalDpi xmlns:a14="http://schemas.microsoft.com/office/drawing/2010/main"/>
-              </a:ext>
-            </a:extLst>
-          </a:blip>
-          <a:srcRect/>
-          <a:stretch>
-            <a:fillRect/>
-          </a:stretch>
-        </p:blipFill>
-        <p:spPr/>
-      </p:pic>
-      <p:sp>
-        <p:nvSpPr>
-          <p:cNvPr id="37" name="Text Placeholder">
-            <a:extLst>
-              <a:ext uri="{FF2B5EF4-FFF2-40B4-BE49-F238E27FC236}">
-                <a16:creationId xmlns:a16="http://schemas.microsoft.com/office/drawing/2014/main" id="{3A30B02E-FBE1-41C5-AF6E-E1013275E84A}"/>
-              </a:ext>
-            </a:extLst>
-          </p:cNvPr>
-          <p:cNvSpPr>
-            <a:spLocks noGrp="1"/>
-          </p:cNvSpPr>
-          <p:nvPr>
-            <p:ph type="body" sz="quarter" idx="49"/>
-          </p:nvPr>
-        </p:nvSpPr>
-        <p:spPr>
-          <a:xfrm>
-            <a:off x="838200" y="1135844"/>
-            <a:ext cx="1877575" cy="665169"/>
-          </a:xfrm>
-        </p:spPr>
-        <p:txBody>
-          <a:bodyPr/>
-          <a:lstStyle/>
-          <a:p>
-            <a:r>
-              <a:rPr lang="en-US" dirty="0"/>
-              <a:t>Developing Targeted Campaigns</a:t>
-            </a:r>
-            <a:endParaRPr lang="zh-CN" altLang="en-US" dirty="0"/>
-          </a:p>
-        </p:txBody>
-      </p:sp>
-      <p:pic>
-        <p:nvPicPr>
-          <p:cNvPr id="12" name="Picture Placeholder 11" descr="Layout of website design sketches on white paper">
-            <a:extLst>
-              <a:ext uri="{FF2B5EF4-FFF2-40B4-BE49-F238E27FC236}">
-                <a16:creationId xmlns:a16="http://schemas.microsoft.com/office/drawing/2014/main" id="{3D51D04D-653C-45AE-9DDF-BE96BA267A6B}"/>
-              </a:ext>
-            </a:extLst>
-          </p:cNvPr>
-          <p:cNvPicPr>
-            <a:picLocks noGrp="1" noChangeAspect="1"/>
-          </p:cNvPicPr>
-          <p:nvPr>
-            <p:ph type="pic" sz="quarter" idx="59"/>
-          </p:nvPr>
-        </p:nvPicPr>
-        <p:blipFill>
-          <a:blip r:embed="rId5" cstate="print">
-            <a:extLst>
-              <a:ext uri="{28A0092B-C50C-407E-A947-70E740481C1C}">
-                <a14:useLocalDpi xmlns:a14="http://schemas.microsoft.com/office/drawing/2010/main"/>
-              </a:ext>
-            </a:extLst>
-          </a:blip>
-          <a:srcRect/>
-          <a:stretch>
-            <a:fillRect/>
-          </a:stretch>
-        </p:blipFill>
-        <p:spPr/>
-      </p:pic>
-      <p:sp>
-        <p:nvSpPr>
-          <p:cNvPr id="40" name="Text Placeholder">
-            <a:extLst>
-              <a:ext uri="{FF2B5EF4-FFF2-40B4-BE49-F238E27FC236}">
-                <a16:creationId xmlns:a16="http://schemas.microsoft.com/office/drawing/2014/main" id="{17095E6E-F279-4342-B53E-E53B820336B3}"/>
-              </a:ext>
-            </a:extLst>
-          </p:cNvPr>
-          <p:cNvSpPr>
-            <a:spLocks noGrp="1"/>
-          </p:cNvSpPr>
-          <p:nvPr>
-            <p:ph type="body" sz="quarter" idx="52"/>
-          </p:nvPr>
-        </p:nvSpPr>
-        <p:spPr>
-          <a:xfrm>
-            <a:off x="5164755" y="1135844"/>
-            <a:ext cx="1691687" cy="811178"/>
-          </a:xfrm>
-        </p:spPr>
-        <p:txBody>
-          <a:bodyPr/>
-          <a:lstStyle/>
-          <a:p>
-            <a:pPr>
-              <a:spcBef>
-                <a:spcPts val="1000"/>
-              </a:spcBef>
-            </a:pPr>
-            <a:r>
-              <a:rPr lang="en-US" sz="1800" b="1" dirty="0">
-                <a:ea typeface="+mn-ea"/>
-                <a:cs typeface="+mn-cs"/>
-              </a:rPr>
-              <a:t>Influencer and Referral Programs</a:t>
-            </a:r>
-            <a:endParaRPr lang="en-US" altLang="zh-CN" sz="1800" b="1" dirty="0">
-              <a:ea typeface="+mn-ea"/>
-              <a:cs typeface="+mn-cs"/>
-            </a:endParaRPr>
-          </a:p>
-        </p:txBody>
-      </p:sp>
-      <p:pic>
-        <p:nvPicPr>
-          <p:cNvPr id="14" name="Picture Placeholder 13" descr="Empty office chairs">
-            <a:extLst>
-              <a:ext uri="{FF2B5EF4-FFF2-40B4-BE49-F238E27FC236}">
-                <a16:creationId xmlns:a16="http://schemas.microsoft.com/office/drawing/2014/main" id="{33C59A08-3A06-4556-AC83-C1337E73D0B3}"/>
-              </a:ext>
-            </a:extLst>
-          </p:cNvPr>
-          <p:cNvPicPr>
-            <a:picLocks noGrp="1" noChangeAspect="1"/>
-          </p:cNvPicPr>
-          <p:nvPr>
-            <p:ph type="pic" sz="quarter" idx="60"/>
-          </p:nvPr>
-        </p:nvPicPr>
-        <p:blipFill>
-          <a:blip r:embed="rId6" cstate="print">
-            <a:extLst>
-              <a:ext uri="{28A0092B-C50C-407E-A947-70E740481C1C}">
-                <a14:useLocalDpi xmlns:a14="http://schemas.microsoft.com/office/drawing/2010/main"/>
-              </a:ext>
-            </a:extLst>
-          </a:blip>
-          <a:srcRect/>
-          <a:stretch>
-            <a:fillRect/>
-          </a:stretch>
-        </p:blipFill>
-        <p:spPr>
-          <a:xfrm>
-            <a:off x="7361472" y="2073439"/>
-            <a:ext cx="1621032" cy="1841551"/>
-          </a:xfrm>
-        </p:spPr>
-      </p:pic>
-      <p:sp>
-        <p:nvSpPr>
-          <p:cNvPr id="41" name="Text Placeholder">
-            <a:extLst>
-              <a:ext uri="{FF2B5EF4-FFF2-40B4-BE49-F238E27FC236}">
-                <a16:creationId xmlns:a16="http://schemas.microsoft.com/office/drawing/2014/main" id="{DBA8686B-D3EF-40DF-939C-F875885DD598}"/>
-              </a:ext>
-            </a:extLst>
-          </p:cNvPr>
-          <p:cNvSpPr>
-            <a:spLocks noGrp="1"/>
-          </p:cNvSpPr>
-          <p:nvPr>
-            <p:ph type="body" sz="quarter" idx="53"/>
-          </p:nvPr>
-        </p:nvSpPr>
-        <p:spPr/>
-        <p:txBody>
-          <a:bodyPr/>
-          <a:lstStyle/>
-          <a:p>
-            <a:r>
-              <a:rPr lang="en-US" dirty="0"/>
-              <a:t>Leverage Customer Testimonials</a:t>
-            </a:r>
-            <a:endParaRPr lang="zh-CN" altLang="en-US" dirty="0"/>
-          </a:p>
-        </p:txBody>
-      </p:sp>
-      <p:pic>
-        <p:nvPicPr>
-          <p:cNvPr id="90" name="Picture Placeholder 89" descr="People around a table on their laptops">
-            <a:extLst>
-              <a:ext uri="{FF2B5EF4-FFF2-40B4-BE49-F238E27FC236}">
-                <a16:creationId xmlns:a16="http://schemas.microsoft.com/office/drawing/2014/main" id="{241F4F4E-4DAB-34E3-D036-85F0CB76A536}"/>
-              </a:ext>
-            </a:extLst>
-          </p:cNvPr>
-          <p:cNvPicPr>
-            <a:picLocks noGrp="1" noChangeAspect="1"/>
-          </p:cNvPicPr>
-          <p:nvPr>
-            <p:ph type="pic" sz="quarter" idx="61"/>
-          </p:nvPr>
-        </p:nvPicPr>
-        <p:blipFill rotWithShape="1">
-          <a:blip r:embed="rId7" cstate="print">
-            <a:extLst>
-              <a:ext uri="{28A0092B-C50C-407E-A947-70E740481C1C}">
-                <a14:useLocalDpi xmlns:a14="http://schemas.microsoft.com/office/drawing/2010/main"/>
-              </a:ext>
-            </a:extLst>
-          </a:blip>
-          <a:srcRect/>
-          <a:stretch/>
-        </p:blipFill>
-        <p:spPr/>
-      </p:pic>
-      <p:sp>
-        <p:nvSpPr>
-          <p:cNvPr id="43" name="Text Placeholder">
-            <a:extLst>
-              <a:ext uri="{FF2B5EF4-FFF2-40B4-BE49-F238E27FC236}">
-                <a16:creationId xmlns:a16="http://schemas.microsoft.com/office/drawing/2014/main" id="{759A333C-6D37-427A-BE2A-4C2660134A5A}"/>
-              </a:ext>
-            </a:extLst>
-          </p:cNvPr>
-          <p:cNvSpPr>
-            <a:spLocks noGrp="1"/>
-          </p:cNvSpPr>
-          <p:nvPr>
-            <p:ph type="body" sz="quarter" idx="55"/>
-          </p:nvPr>
-        </p:nvSpPr>
-        <p:spPr>
-          <a:xfrm>
-            <a:off x="9305422" y="1273045"/>
-            <a:ext cx="1877575" cy="506399"/>
-          </a:xfrm>
-        </p:spPr>
-        <p:txBody>
-          <a:bodyPr/>
-          <a:lstStyle/>
-          <a:p>
-            <a:r>
-              <a:rPr lang="en-US" dirty="0"/>
-              <a:t>Enhance post-sale engagement</a:t>
-            </a:r>
-            <a:endParaRPr lang="zh-CN" altLang="en-US" dirty="0"/>
-          </a:p>
-        </p:txBody>
-      </p:sp>
-      <p:sp>
-        <p:nvSpPr>
-          <p:cNvPr id="4" name="Footer Placeholder 3">
-            <a:extLst>
-              <a:ext uri="{FF2B5EF4-FFF2-40B4-BE49-F238E27FC236}">
-                <a16:creationId xmlns:a16="http://schemas.microsoft.com/office/drawing/2014/main" id="{695DA9C9-8185-D0AB-3C76-BC1CABABA354}"/>
-              </a:ext>
-            </a:extLst>
-          </p:cNvPr>
-          <p:cNvSpPr>
-            <a:spLocks noGrp="1"/>
-          </p:cNvSpPr>
-          <p:nvPr>
-            <p:ph type="ftr" sz="quarter" idx="62"/>
-          </p:nvPr>
-        </p:nvSpPr>
-        <p:spPr/>
-        <p:txBody>
-          <a:bodyPr/>
-          <a:lstStyle/>
-          <a:p>
-            <a:r>
-              <a:rPr lang="en-US"/>
-              <a:t>Presentation title</a:t>
-            </a:r>
-            <a:endParaRPr lang="en-US" dirty="0"/>
-          </a:p>
-        </p:txBody>
-      </p:sp>
-    </p:spTree>
-    <p:extLst>
-      <p:ext uri="{BB962C8B-B14F-4D97-AF65-F5344CB8AC3E}">
-        <p14:creationId xmlns:p14="http://schemas.microsoft.com/office/powerpoint/2010/main" val="2517140333"/>
-      </p:ext>
-    </p:extLst>
-  </p:cSld>
-  <p:clrMapOvr>
-    <a:masterClrMapping/>
-  </p:clrMapOvr>
-</p:sld>
-</file>
-
-<file path=ppt/slides/slide16.xml><?xml version="1.0" encoding="utf-8"?>
-<p:sld xmlns:a="http://schemas.openxmlformats.org/drawingml/2006/main" xmlns:r="http://schemas.openxmlformats.org/officeDocument/2006/relationships" xmlns:p="http://schemas.openxmlformats.org/presentationml/2006/main">
-  <p:cSld>
-    <p:spTree>
-      <p:nvGrpSpPr>
-        <p:cNvPr id="1" name=""/>
-        <p:cNvGrpSpPr/>
-        <p:nvPr/>
-      </p:nvGrpSpPr>
-      <p:grpSpPr>
-        <a:xfrm>
-          <a:off x="0" y="0"/>
-          <a:ext cx="0" cy="0"/>
-          <a:chOff x="0" y="0"/>
-          <a:chExt cx="0" cy="0"/>
-        </a:xfrm>
-      </p:grpSpPr>
-      <p:sp>
-        <p:nvSpPr>
-          <p:cNvPr id="46" name="Title 45">
-            <a:extLst>
-              <a:ext uri="{FF2B5EF4-FFF2-40B4-BE49-F238E27FC236}">
-                <a16:creationId xmlns:a16="http://schemas.microsoft.com/office/drawing/2014/main" id="{4D761329-3BEF-0173-1328-A4DB26572AFF}"/>
-              </a:ext>
-            </a:extLst>
-          </p:cNvPr>
-          <p:cNvSpPr>
-            <a:spLocks noGrp="1"/>
-          </p:cNvSpPr>
-          <p:nvPr>
-            <p:ph type="title"/>
-          </p:nvPr>
-        </p:nvSpPr>
-        <p:spPr/>
-        <p:txBody>
-          <a:bodyPr/>
-          <a:lstStyle/>
-          <a:p>
-            <a:r>
-              <a:rPr lang="en-US" dirty="0"/>
-              <a:t>Ethical, legal, societal implications</a:t>
-            </a:r>
-          </a:p>
-        </p:txBody>
-      </p:sp>
-      <p:sp>
-        <p:nvSpPr>
-          <p:cNvPr id="19" name="Text Placeholder 18">
-            <a:extLst>
-              <a:ext uri="{FF2B5EF4-FFF2-40B4-BE49-F238E27FC236}">
-                <a16:creationId xmlns:a16="http://schemas.microsoft.com/office/drawing/2014/main" id="{FC101F03-8617-09D4-619B-F38E2F0A4F15}"/>
-              </a:ext>
-            </a:extLst>
-          </p:cNvPr>
-          <p:cNvSpPr>
-            <a:spLocks noGrp="1"/>
-          </p:cNvSpPr>
-          <p:nvPr>
-            <p:ph type="body" sz="quarter" idx="28"/>
-          </p:nvPr>
-        </p:nvSpPr>
-        <p:spPr/>
-        <p:txBody>
-          <a:bodyPr/>
-          <a:lstStyle/>
-          <a:p>
-            <a:r>
-              <a:rPr lang="en-US" dirty="0"/>
-              <a:t>ANNUAL REVENUE GROWTH</a:t>
-            </a:r>
-          </a:p>
-          <a:p>
-            <a:endParaRPr lang="en-US" dirty="0"/>
-          </a:p>
-        </p:txBody>
-      </p:sp>
-      <p:pic>
-        <p:nvPicPr>
-          <p:cNvPr id="48" name="Picture placeholder 19" descr="Layout of website design sketches on white paper">
-            <a:extLst>
-              <a:ext uri="{FF2B5EF4-FFF2-40B4-BE49-F238E27FC236}">
-                <a16:creationId xmlns:a16="http://schemas.microsoft.com/office/drawing/2014/main" id="{6D25AB81-B10A-BD11-E8FE-ECF8CB1B12F0}"/>
-              </a:ext>
-            </a:extLst>
-          </p:cNvPr>
-          <p:cNvPicPr>
-            <a:picLocks noGrp="1" noChangeAspect="1"/>
-          </p:cNvPicPr>
-          <p:nvPr>
-            <p:ph type="pic" sz="quarter" idx="47"/>
-          </p:nvPr>
-        </p:nvPicPr>
-        <p:blipFill>
-          <a:blip r:embed="rId3">
-            <a:extLst>
-              <a:ext uri="{28A0092B-C50C-407E-A947-70E740481C1C}">
-                <a14:useLocalDpi xmlns:a14="http://schemas.microsoft.com/office/drawing/2010/main"/>
-              </a:ext>
-            </a:extLst>
-          </a:blip>
-          <a:srcRect/>
-          <a:stretch/>
-        </p:blipFill>
-        <p:spPr>
-          <a:blipFill>
-            <a:blip r:embed="rId4"/>
-            <a:stretch>
-              <a:fillRect/>
-            </a:stretch>
-          </a:blipFill>
-        </p:spPr>
-      </p:pic>
-    </p:spTree>
-    <p:extLst>
-      <p:ext uri="{BB962C8B-B14F-4D97-AF65-F5344CB8AC3E}">
-        <p14:creationId xmlns:p14="http://schemas.microsoft.com/office/powerpoint/2010/main" val="3386411503"/>
-      </p:ext>
-    </p:extLst>
-  </p:cSld>
-  <p:clrMapOvr>
-    <a:masterClrMapping/>
-  </p:clrMapOvr>
-</p:sld>
-</file>
-
-<file path=ppt/slides/slide17.xml><?xml version="1.0" encoding="utf-8"?>
-<p:sld xmlns:a="http://schemas.openxmlformats.org/drawingml/2006/main" xmlns:r="http://schemas.openxmlformats.org/officeDocument/2006/relationships" xmlns:p="http://schemas.openxmlformats.org/presentationml/2006/main">
-  <p:cSld>
-    <p:spTree>
-      <p:nvGrpSpPr>
-        <p:cNvPr id="1" name=""/>
-        <p:cNvGrpSpPr/>
-        <p:nvPr/>
-      </p:nvGrpSpPr>
-      <p:grpSpPr>
-        <a:xfrm>
-          <a:off x="0" y="0"/>
-          <a:ext cx="0" cy="0"/>
-          <a:chOff x="0" y="0"/>
-          <a:chExt cx="0" cy="0"/>
-        </a:xfrm>
-      </p:grpSpPr>
-      <p:sp>
-        <p:nvSpPr>
           <p:cNvPr id="60" name="Title 59">
             <a:extLst>
               <a:ext uri="{FF2B5EF4-FFF2-40B4-BE49-F238E27FC236}">
@@ -26699,7 +26086,7 @@
         </p:nvSpPr>
         <p:spPr>
           <a:xfrm>
-            <a:off x="3974971" y="2046940"/>
+            <a:off x="4059207" y="2046940"/>
             <a:ext cx="2200051" cy="498369"/>
           </a:xfrm>
         </p:spPr>
@@ -26732,7 +26119,7 @@
         </p:nvSpPr>
         <p:spPr>
           <a:xfrm>
-            <a:off x="8042330" y="1752958"/>
+            <a:off x="7011253" y="3852829"/>
             <a:ext cx="3012438" cy="587964"/>
           </a:xfrm>
         </p:spPr>
@@ -26765,7 +26152,7 @@
         </p:nvSpPr>
         <p:spPr>
           <a:xfrm>
-            <a:off x="8042330" y="2429006"/>
+            <a:off x="7094063" y="4540029"/>
             <a:ext cx="2653545" cy="686728"/>
           </a:xfrm>
         </p:spPr>
@@ -26776,404 +26163,6 @@
             <a:r>
               <a:rPr lang="en-US" dirty="0"/>
               <a:t>Ethical marketing must prioritize transparency.</a:t>
-            </a:r>
-          </a:p>
-        </p:txBody>
-      </p:sp>
-      <p:sp>
-        <p:nvSpPr>
-          <p:cNvPr id="9" name="Text Placeholder 36">
-            <a:extLst>
-              <a:ext uri="{FF2B5EF4-FFF2-40B4-BE49-F238E27FC236}">
-                <a16:creationId xmlns:a16="http://schemas.microsoft.com/office/drawing/2014/main" id="{3DC01FA8-55C1-448C-8006-2879BB557858}"/>
-              </a:ext>
-            </a:extLst>
-          </p:cNvPr>
-          <p:cNvSpPr txBox="1">
-            <a:spLocks/>
-          </p:cNvSpPr>
-          <p:nvPr/>
-        </p:nvSpPr>
-        <p:spPr>
-          <a:xfrm>
-            <a:off x="5863927" y="3448285"/>
-            <a:ext cx="2653545" cy="587964"/>
-          </a:xfrm>
-          <a:prstGeom prst="rect">
-            <a:avLst/>
-          </a:prstGeom>
-        </p:spPr>
-        <p:txBody>
-          <a:bodyPr vert="horz" lIns="91440" tIns="45720" rIns="91440" bIns="45720" rtlCol="0" anchor="b">
-            <a:noAutofit/>
-          </a:bodyPr>
-          <a:lstStyle>
-            <a:lvl1pPr marL="0" indent="0" algn="l" defTabSz="914400" rtl="0" eaLnBrk="1" latinLnBrk="0" hangingPunct="1">
-              <a:lnSpc>
-                <a:spcPct val="100000"/>
-              </a:lnSpc>
-              <a:spcBef>
-                <a:spcPts val="1000"/>
-              </a:spcBef>
-              <a:buFont typeface="Arial" panose="020B0604020202020204" pitchFamily="34" charset="0"/>
-              <a:buNone/>
-              <a:defRPr sz="1800" b="1" kern="1200">
-                <a:solidFill>
-                  <a:schemeClr val="accent6"/>
-                </a:solidFill>
-                <a:latin typeface="+mn-lt"/>
-                <a:ea typeface="+mn-ea"/>
-                <a:cs typeface="+mn-cs"/>
-              </a:defRPr>
-            </a:lvl1pPr>
-            <a:lvl2pPr marL="685800" indent="-228600" algn="l" defTabSz="914400" rtl="0" eaLnBrk="1" latinLnBrk="0" hangingPunct="1">
-              <a:lnSpc>
-                <a:spcPct val="90000"/>
-              </a:lnSpc>
-              <a:spcBef>
-                <a:spcPts val="500"/>
-              </a:spcBef>
-              <a:buFont typeface="Arial" panose="020B0604020202020204" pitchFamily="34" charset="0"/>
-              <a:buChar char="•"/>
-              <a:defRPr sz="1000" kern="1200">
-                <a:solidFill>
-                  <a:schemeClr val="accent6"/>
-                </a:solidFill>
-                <a:latin typeface="+mn-lt"/>
-                <a:ea typeface="+mn-ea"/>
-                <a:cs typeface="+mn-cs"/>
-              </a:defRPr>
-            </a:lvl2pPr>
-            <a:lvl3pPr marL="1143000" indent="-228600" algn="l" defTabSz="914400" rtl="0" eaLnBrk="1" latinLnBrk="0" hangingPunct="1">
-              <a:lnSpc>
-                <a:spcPct val="90000"/>
-              </a:lnSpc>
-              <a:spcBef>
-                <a:spcPts val="500"/>
-              </a:spcBef>
-              <a:buFont typeface="Arial" panose="020B0604020202020204" pitchFamily="34" charset="0"/>
-              <a:buChar char="•"/>
-              <a:defRPr sz="900" kern="1200">
-                <a:solidFill>
-                  <a:schemeClr val="accent6"/>
-                </a:solidFill>
-                <a:latin typeface="+mn-lt"/>
-                <a:ea typeface="+mn-ea"/>
-                <a:cs typeface="+mn-cs"/>
-              </a:defRPr>
-            </a:lvl3pPr>
-            <a:lvl4pPr marL="1600200" indent="-228600" algn="l" defTabSz="914400" rtl="0" eaLnBrk="1" latinLnBrk="0" hangingPunct="1">
-              <a:lnSpc>
-                <a:spcPct val="90000"/>
-              </a:lnSpc>
-              <a:spcBef>
-                <a:spcPts val="500"/>
-              </a:spcBef>
-              <a:buFont typeface="Arial" panose="020B0604020202020204" pitchFamily="34" charset="0"/>
-              <a:buChar char="•"/>
-              <a:defRPr sz="800" kern="1200">
-                <a:solidFill>
-                  <a:schemeClr val="accent6"/>
-                </a:solidFill>
-                <a:latin typeface="+mn-lt"/>
-                <a:ea typeface="+mn-ea"/>
-                <a:cs typeface="+mn-cs"/>
-              </a:defRPr>
-            </a:lvl4pPr>
-            <a:lvl5pPr marL="2057400" indent="-228600" algn="l" defTabSz="914400" rtl="0" eaLnBrk="1" latinLnBrk="0" hangingPunct="1">
-              <a:lnSpc>
-                <a:spcPct val="90000"/>
-              </a:lnSpc>
-              <a:spcBef>
-                <a:spcPts val="500"/>
-              </a:spcBef>
-              <a:buFont typeface="Arial" panose="020B0604020202020204" pitchFamily="34" charset="0"/>
-              <a:buChar char="•"/>
-              <a:defRPr sz="800" kern="1200">
-                <a:solidFill>
-                  <a:schemeClr val="accent6"/>
-                </a:solidFill>
-                <a:latin typeface="+mn-lt"/>
-                <a:ea typeface="+mn-ea"/>
-                <a:cs typeface="+mn-cs"/>
-              </a:defRPr>
-            </a:lvl5pPr>
-            <a:lvl6pPr marL="2514600" indent="-228600" algn="l" defTabSz="914400" rtl="0" eaLnBrk="1" latinLnBrk="0" hangingPunct="1">
-              <a:lnSpc>
-                <a:spcPct val="90000"/>
-              </a:lnSpc>
-              <a:spcBef>
-                <a:spcPts val="500"/>
-              </a:spcBef>
-              <a:buFont typeface="Arial" panose="020B0604020202020204" pitchFamily="34" charset="0"/>
-              <a:buChar char="•"/>
-              <a:defRPr sz="1800" kern="1200">
-                <a:solidFill>
-                  <a:schemeClr val="tx1"/>
-                </a:solidFill>
-                <a:latin typeface="+mn-lt"/>
-                <a:ea typeface="+mn-ea"/>
-                <a:cs typeface="+mn-cs"/>
-              </a:defRPr>
-            </a:lvl6pPr>
-            <a:lvl7pPr marL="2971800" indent="-228600" algn="l" defTabSz="914400" rtl="0" eaLnBrk="1" latinLnBrk="0" hangingPunct="1">
-              <a:lnSpc>
-                <a:spcPct val="90000"/>
-              </a:lnSpc>
-              <a:spcBef>
-                <a:spcPts val="500"/>
-              </a:spcBef>
-              <a:buFont typeface="Arial" panose="020B0604020202020204" pitchFamily="34" charset="0"/>
-              <a:buChar char="•"/>
-              <a:defRPr sz="1800" kern="1200">
-                <a:solidFill>
-                  <a:schemeClr val="tx1"/>
-                </a:solidFill>
-                <a:latin typeface="+mn-lt"/>
-                <a:ea typeface="+mn-ea"/>
-                <a:cs typeface="+mn-cs"/>
-              </a:defRPr>
-            </a:lvl7pPr>
-            <a:lvl8pPr marL="3429000" indent="-228600" algn="l" defTabSz="914400" rtl="0" eaLnBrk="1" latinLnBrk="0" hangingPunct="1">
-              <a:lnSpc>
-                <a:spcPct val="90000"/>
-              </a:lnSpc>
-              <a:spcBef>
-                <a:spcPts val="500"/>
-              </a:spcBef>
-              <a:buFont typeface="Arial" panose="020B0604020202020204" pitchFamily="34" charset="0"/>
-              <a:buChar char="•"/>
-              <a:defRPr sz="1800" kern="1200">
-                <a:solidFill>
-                  <a:schemeClr val="tx1"/>
-                </a:solidFill>
-                <a:latin typeface="+mn-lt"/>
-                <a:ea typeface="+mn-ea"/>
-                <a:cs typeface="+mn-cs"/>
-              </a:defRPr>
-            </a:lvl8pPr>
-            <a:lvl9pPr marL="3886200" indent="-228600" algn="l" defTabSz="914400" rtl="0" eaLnBrk="1" latinLnBrk="0" hangingPunct="1">
-              <a:lnSpc>
-                <a:spcPct val="90000"/>
-              </a:lnSpc>
-              <a:spcBef>
-                <a:spcPts val="500"/>
-              </a:spcBef>
-              <a:buFont typeface="Arial" panose="020B0604020202020204" pitchFamily="34" charset="0"/>
-              <a:buChar char="•"/>
-              <a:defRPr sz="1800" kern="1200">
-                <a:solidFill>
-                  <a:schemeClr val="tx1"/>
-                </a:solidFill>
-                <a:latin typeface="+mn-lt"/>
-                <a:ea typeface="+mn-ea"/>
-                <a:cs typeface="+mn-cs"/>
-              </a:defRPr>
-            </a:lvl9pPr>
-          </a:lstStyle>
-          <a:p>
-            <a:r>
-              <a:rPr lang="en-US" dirty="0"/>
-              <a:t>Exploitation of Vulnerable Groups</a:t>
-            </a:r>
-          </a:p>
-        </p:txBody>
-      </p:sp>
-      <p:sp>
-        <p:nvSpPr>
-          <p:cNvPr id="10" name="Text Placeholder 42">
-            <a:extLst>
-              <a:ext uri="{FF2B5EF4-FFF2-40B4-BE49-F238E27FC236}">
-                <a16:creationId xmlns:a16="http://schemas.microsoft.com/office/drawing/2014/main" id="{7F0EE3C4-8F01-4BB0-B6C7-FE23022B8ED4}"/>
-              </a:ext>
-            </a:extLst>
-          </p:cNvPr>
-          <p:cNvSpPr txBox="1">
-            <a:spLocks/>
-          </p:cNvSpPr>
-          <p:nvPr/>
-        </p:nvSpPr>
-        <p:spPr>
-          <a:xfrm>
-            <a:off x="5863927" y="4096583"/>
-            <a:ext cx="2200051" cy="498369"/>
-          </a:xfrm>
-          <a:prstGeom prst="rect">
-            <a:avLst/>
-          </a:prstGeom>
-        </p:spPr>
-        <p:txBody>
-          <a:bodyPr vert="horz" lIns="91440" tIns="45720" rIns="91440" bIns="45720" rtlCol="0">
-            <a:noAutofit/>
-          </a:bodyPr>
-          <a:lstStyle>
-            <a:lvl1pPr marL="0" indent="0" algn="l" defTabSz="914400" rtl="0" eaLnBrk="1" latinLnBrk="0" hangingPunct="1">
-              <a:lnSpc>
-                <a:spcPct val="100000"/>
-              </a:lnSpc>
-              <a:spcBef>
-                <a:spcPts val="0"/>
-              </a:spcBef>
-              <a:buFont typeface="Arial" panose="020B0604020202020204" pitchFamily="34" charset="0"/>
-              <a:buNone/>
-              <a:defRPr sz="1400" b="0" kern="1200">
-                <a:solidFill>
-                  <a:schemeClr val="accent6"/>
-                </a:solidFill>
-                <a:latin typeface="+mn-lt"/>
-                <a:ea typeface="+mn-ea"/>
-                <a:cs typeface="+mn-cs"/>
-              </a:defRPr>
-            </a:lvl1pPr>
-            <a:lvl2pPr marL="685800" indent="-228600" algn="l" defTabSz="914400" rtl="0" eaLnBrk="1" latinLnBrk="0" hangingPunct="1">
-              <a:lnSpc>
-                <a:spcPct val="90000"/>
-              </a:lnSpc>
-              <a:spcBef>
-                <a:spcPts val="500"/>
-              </a:spcBef>
-              <a:buFont typeface="Arial" panose="020B0604020202020204" pitchFamily="34" charset="0"/>
-              <a:buChar char="•"/>
-              <a:defRPr sz="1000" kern="1200">
-                <a:solidFill>
-                  <a:schemeClr val="accent6"/>
-                </a:solidFill>
-                <a:latin typeface="+mn-lt"/>
-                <a:ea typeface="+mn-ea"/>
-                <a:cs typeface="+mn-cs"/>
-              </a:defRPr>
-            </a:lvl2pPr>
-            <a:lvl3pPr marL="1143000" indent="-228600" algn="l" defTabSz="914400" rtl="0" eaLnBrk="1" latinLnBrk="0" hangingPunct="1">
-              <a:lnSpc>
-                <a:spcPct val="90000"/>
-              </a:lnSpc>
-              <a:spcBef>
-                <a:spcPts val="500"/>
-              </a:spcBef>
-              <a:buFont typeface="Arial" panose="020B0604020202020204" pitchFamily="34" charset="0"/>
-              <a:buChar char="•"/>
-              <a:defRPr sz="900" kern="1200">
-                <a:solidFill>
-                  <a:schemeClr val="accent6"/>
-                </a:solidFill>
-                <a:latin typeface="+mn-lt"/>
-                <a:ea typeface="+mn-ea"/>
-                <a:cs typeface="+mn-cs"/>
-              </a:defRPr>
-            </a:lvl3pPr>
-            <a:lvl4pPr marL="1600200" indent="-228600" algn="l" defTabSz="914400" rtl="0" eaLnBrk="1" latinLnBrk="0" hangingPunct="1">
-              <a:lnSpc>
-                <a:spcPct val="90000"/>
-              </a:lnSpc>
-              <a:spcBef>
-                <a:spcPts val="500"/>
-              </a:spcBef>
-              <a:buFont typeface="Arial" panose="020B0604020202020204" pitchFamily="34" charset="0"/>
-              <a:buChar char="•"/>
-              <a:defRPr sz="800" kern="1200">
-                <a:solidFill>
-                  <a:schemeClr val="accent6"/>
-                </a:solidFill>
-                <a:latin typeface="+mn-lt"/>
-                <a:ea typeface="+mn-ea"/>
-                <a:cs typeface="+mn-cs"/>
-              </a:defRPr>
-            </a:lvl4pPr>
-            <a:lvl5pPr marL="2057400" indent="-228600" algn="l" defTabSz="914400" rtl="0" eaLnBrk="1" latinLnBrk="0" hangingPunct="1">
-              <a:lnSpc>
-                <a:spcPct val="90000"/>
-              </a:lnSpc>
-              <a:spcBef>
-                <a:spcPts val="500"/>
-              </a:spcBef>
-              <a:buFont typeface="Arial" panose="020B0604020202020204" pitchFamily="34" charset="0"/>
-              <a:buChar char="•"/>
-              <a:defRPr sz="800" kern="1200">
-                <a:solidFill>
-                  <a:schemeClr val="accent6"/>
-                </a:solidFill>
-                <a:latin typeface="+mn-lt"/>
-                <a:ea typeface="+mn-ea"/>
-                <a:cs typeface="+mn-cs"/>
-              </a:defRPr>
-            </a:lvl5pPr>
-            <a:lvl6pPr marL="2514600" indent="-228600" algn="l" defTabSz="914400" rtl="0" eaLnBrk="1" latinLnBrk="0" hangingPunct="1">
-              <a:lnSpc>
-                <a:spcPct val="90000"/>
-              </a:lnSpc>
-              <a:spcBef>
-                <a:spcPts val="500"/>
-              </a:spcBef>
-              <a:buFont typeface="Arial" panose="020B0604020202020204" pitchFamily="34" charset="0"/>
-              <a:buChar char="•"/>
-              <a:defRPr sz="1800" kern="1200">
-                <a:solidFill>
-                  <a:schemeClr val="tx1"/>
-                </a:solidFill>
-                <a:latin typeface="+mn-lt"/>
-                <a:ea typeface="+mn-ea"/>
-                <a:cs typeface="+mn-cs"/>
-              </a:defRPr>
-            </a:lvl6pPr>
-            <a:lvl7pPr marL="2971800" indent="-228600" algn="l" defTabSz="914400" rtl="0" eaLnBrk="1" latinLnBrk="0" hangingPunct="1">
-              <a:lnSpc>
-                <a:spcPct val="90000"/>
-              </a:lnSpc>
-              <a:spcBef>
-                <a:spcPts val="500"/>
-              </a:spcBef>
-              <a:buFont typeface="Arial" panose="020B0604020202020204" pitchFamily="34" charset="0"/>
-              <a:buChar char="•"/>
-              <a:defRPr sz="1800" kern="1200">
-                <a:solidFill>
-                  <a:schemeClr val="tx1"/>
-                </a:solidFill>
-                <a:latin typeface="+mn-lt"/>
-                <a:ea typeface="+mn-ea"/>
-                <a:cs typeface="+mn-cs"/>
-              </a:defRPr>
-            </a:lvl7pPr>
-            <a:lvl8pPr marL="3429000" indent="-228600" algn="l" defTabSz="914400" rtl="0" eaLnBrk="1" latinLnBrk="0" hangingPunct="1">
-              <a:lnSpc>
-                <a:spcPct val="90000"/>
-              </a:lnSpc>
-              <a:spcBef>
-                <a:spcPts val="500"/>
-              </a:spcBef>
-              <a:buFont typeface="Arial" panose="020B0604020202020204" pitchFamily="34" charset="0"/>
-              <a:buChar char="•"/>
-              <a:defRPr sz="1800" kern="1200">
-                <a:solidFill>
-                  <a:schemeClr val="tx1"/>
-                </a:solidFill>
-                <a:latin typeface="+mn-lt"/>
-                <a:ea typeface="+mn-ea"/>
-                <a:cs typeface="+mn-cs"/>
-              </a:defRPr>
-            </a:lvl8pPr>
-            <a:lvl9pPr marL="3886200" indent="-228600" algn="l" defTabSz="914400" rtl="0" eaLnBrk="1" latinLnBrk="0" hangingPunct="1">
-              <a:lnSpc>
-                <a:spcPct val="90000"/>
-              </a:lnSpc>
-              <a:spcBef>
-                <a:spcPts val="500"/>
-              </a:spcBef>
-              <a:buFont typeface="Arial" panose="020B0604020202020204" pitchFamily="34" charset="0"/>
-              <a:buChar char="•"/>
-              <a:defRPr sz="1800" kern="1200">
-                <a:solidFill>
-                  <a:schemeClr val="tx1"/>
-                </a:solidFill>
-                <a:latin typeface="+mn-lt"/>
-                <a:ea typeface="+mn-ea"/>
-                <a:cs typeface="+mn-cs"/>
-              </a:defRPr>
-            </a:lvl9pPr>
-          </a:lstStyle>
-          <a:p>
-            <a:r>
-              <a:rPr lang="en-US" dirty="0"/>
-              <a:t>Ensuring value across demographic groups</a:t>
             </a:r>
           </a:p>
         </p:txBody>
@@ -27191,7 +26180,7 @@
 </p:sld>
 </file>
 
-<file path=ppt/slides/slide18.xml><?xml version="1.0" encoding="utf-8"?>
+<file path=ppt/slides/slide16.xml><?xml version="1.0" encoding="utf-8"?>
 <p:sld xmlns:a="http://schemas.openxmlformats.org/drawingml/2006/main" xmlns:r="http://schemas.openxmlformats.org/officeDocument/2006/relationships" xmlns:p="http://schemas.openxmlformats.org/presentationml/2006/main">
   <p:cSld>
     <p:spTree>
@@ -28189,7 +27178,7 @@
                 <a:ea typeface="Calibri" panose="020F0502020204030204" pitchFamily="34" charset="0"/>
                 <a:cs typeface="+mn-cs"/>
               </a:rPr>
-              <a:t>For this project: Factors – Sources of Information -  Influencing Decision Making</a:t>
+              <a:t>For this project: Factors – Sources of Information -  Influencing Decision Making for Demographic Groups</a:t>
             </a:r>
           </a:p>
         </p:txBody>
@@ -29604,26 +28593,6 @@
 </file>
 
 <file path=customXml/item1.xml><?xml version="1.0" encoding="utf-8"?>
-<p:properties xmlns:p="http://schemas.microsoft.com/office/2006/metadata/properties" xmlns:xsi="http://www.w3.org/2001/XMLSchema-instance" xmlns:pc="http://schemas.microsoft.com/office/infopath/2007/PartnerControls">
-  <documentManagement>
-    <_ip_UnifiedCompliancePolicyUIAction xmlns="http://schemas.microsoft.com/sharepoint/v3" xsi:nil="true"/>
-    <Image xmlns="71af3243-3dd4-4a8d-8c0d-dd76da1f02a5">
-      <Url xsi:nil="true"/>
-      <Description xsi:nil="true"/>
-    </Image>
-    <Status xmlns="71af3243-3dd4-4a8d-8c0d-dd76da1f02a5">Not started</Status>
-    <Background xmlns="71af3243-3dd4-4a8d-8c0d-dd76da1f02a5">false</Background>
-    <_ip_UnifiedCompliancePolicyProperties xmlns="http://schemas.microsoft.com/sharepoint/v3" xsi:nil="true"/>
-    <ImageTagsTaxHTField xmlns="71af3243-3dd4-4a8d-8c0d-dd76da1f02a5">
-      <Terms xmlns="http://schemas.microsoft.com/office/infopath/2007/PartnerControls"/>
-    </ImageTagsTaxHTField>
-    <TaxCatchAll xmlns="230e9df3-be65-4c73-a93b-d1236ebd677e" xsi:nil="true"/>
-    <MediaServiceKeyPoints xmlns="71af3243-3dd4-4a8d-8c0d-dd76da1f02a5" xsi:nil="true"/>
-  </documentManagement>
-</p:properties>
-</file>
-
-<file path=customXml/item2.xml><?xml version="1.0" encoding="utf-8"?>
 <ct:contentTypeSchema xmlns:ct="http://schemas.microsoft.com/office/2006/metadata/contentType" xmlns:ma="http://schemas.microsoft.com/office/2006/metadata/properties/metaAttributes" ct:_="" ma:_="" ma:contentTypeName="Document" ma:contentTypeID="0x01010079F111ED35F8CC479449609E8A0923A6" ma:contentTypeVersion="28" ma:contentTypeDescription="Create a new document." ma:contentTypeScope="" ma:versionID="60f5a4f2d2b0abadcf532d48ebf9cb71">
   <xsd:schema xmlns:xsd="http://www.w3.org/2001/XMLSchema" xmlns:xs="http://www.w3.org/2001/XMLSchema" xmlns:p="http://schemas.microsoft.com/office/2006/metadata/properties" xmlns:ns1="http://schemas.microsoft.com/sharepoint/v3" xmlns:ns2="71af3243-3dd4-4a8d-8c0d-dd76da1f02a5" xmlns:ns3="16c05727-aa75-4e4a-9b5f-8a80a1165891" xmlns:ns4="230e9df3-be65-4c73-a93b-d1236ebd677e" targetNamespace="http://schemas.microsoft.com/office/2006/metadata/properties" ma:root="true" ma:fieldsID="7dd78129e6a1811f84807ad11c651531" ns1:_="" ns2:_="" ns3:_="" ns4:_="">
     <xsd:import namespace="http://schemas.microsoft.com/sharepoint/v3"/>
@@ -29935,6 +28904,26 @@
 </ct:contentTypeSchema>
 </file>
 
+<file path=customXml/item2.xml><?xml version="1.0" encoding="utf-8"?>
+<p:properties xmlns:p="http://schemas.microsoft.com/office/2006/metadata/properties" xmlns:xsi="http://www.w3.org/2001/XMLSchema-instance" xmlns:pc="http://schemas.microsoft.com/office/infopath/2007/PartnerControls">
+  <documentManagement>
+    <_ip_UnifiedCompliancePolicyUIAction xmlns="http://schemas.microsoft.com/sharepoint/v3" xsi:nil="true"/>
+    <Image xmlns="71af3243-3dd4-4a8d-8c0d-dd76da1f02a5">
+      <Url xsi:nil="true"/>
+      <Description xsi:nil="true"/>
+    </Image>
+    <Status xmlns="71af3243-3dd4-4a8d-8c0d-dd76da1f02a5">Not started</Status>
+    <Background xmlns="71af3243-3dd4-4a8d-8c0d-dd76da1f02a5">false</Background>
+    <_ip_UnifiedCompliancePolicyProperties xmlns="http://schemas.microsoft.com/sharepoint/v3" xsi:nil="true"/>
+    <ImageTagsTaxHTField xmlns="71af3243-3dd4-4a8d-8c0d-dd76da1f02a5">
+      <Terms xmlns="http://schemas.microsoft.com/office/infopath/2007/PartnerControls"/>
+    </ImageTagsTaxHTField>
+    <TaxCatchAll xmlns="230e9df3-be65-4c73-a93b-d1236ebd677e" xsi:nil="true"/>
+    <MediaServiceKeyPoints xmlns="71af3243-3dd4-4a8d-8c0d-dd76da1f02a5" xsi:nil="true"/>
+  </documentManagement>
+</p:properties>
+</file>
+
 <file path=customXml/item3.xml><?xml version="1.0" encoding="utf-8"?>
 <?mso-contentType ?>
 <FormTemplates xmlns="http://schemas.microsoft.com/sharepoint/v3/contenttype/forms">
@@ -29945,18 +28934,6 @@
 </file>
 
 <file path=customXml/itemProps1.xml><?xml version="1.0" encoding="utf-8"?>
-<ds:datastoreItem xmlns:ds="http://schemas.openxmlformats.org/officeDocument/2006/customXml" ds:itemID="{A0AD9BE2-6B3D-4616-B044-300A8177DEA5}">
-  <ds:schemaRefs>
-    <ds:schemaRef ds:uri="http://schemas.microsoft.com/office/2006/metadata/properties"/>
-    <ds:schemaRef ds:uri="http://schemas.microsoft.com/office/infopath/2007/PartnerControls"/>
-    <ds:schemaRef ds:uri="http://schemas.microsoft.com/sharepoint/v3"/>
-    <ds:schemaRef ds:uri="71af3243-3dd4-4a8d-8c0d-dd76da1f02a5"/>
-    <ds:schemaRef ds:uri="230e9df3-be65-4c73-a93b-d1236ebd677e"/>
-  </ds:schemaRefs>
-</ds:datastoreItem>
-</file>
-
-<file path=customXml/itemProps2.xml><?xml version="1.0" encoding="utf-8"?>
 <ds:datastoreItem xmlns:ds="http://schemas.openxmlformats.org/officeDocument/2006/customXml" ds:itemID="{74CFA8B0-C7B8-4655-A378-2962C04794D3}">
   <ds:schemaRefs>
     <ds:schemaRef ds:uri="http://schemas.microsoft.com/office/2006/metadata/contentType"/>
@@ -29977,6 +28954,18 @@
 </ds:datastoreItem>
 </file>
 
+<file path=customXml/itemProps2.xml><?xml version="1.0" encoding="utf-8"?>
+<ds:datastoreItem xmlns:ds="http://schemas.openxmlformats.org/officeDocument/2006/customXml" ds:itemID="{A0AD9BE2-6B3D-4616-B044-300A8177DEA5}">
+  <ds:schemaRefs>
+    <ds:schemaRef ds:uri="http://schemas.microsoft.com/office/2006/metadata/properties"/>
+    <ds:schemaRef ds:uri="http://schemas.microsoft.com/office/infopath/2007/PartnerControls"/>
+    <ds:schemaRef ds:uri="http://schemas.microsoft.com/sharepoint/v3"/>
+    <ds:schemaRef ds:uri="71af3243-3dd4-4a8d-8c0d-dd76da1f02a5"/>
+    <ds:schemaRef ds:uri="230e9df3-be65-4c73-a93b-d1236ebd677e"/>
+  </ds:schemaRefs>
+</ds:datastoreItem>
+</file>
+
 <file path=customXml/itemProps3.xml><?xml version="1.0" encoding="utf-8"?>
 <ds:datastoreItem xmlns:ds="http://schemas.openxmlformats.org/officeDocument/2006/customXml" ds:itemID="{45515263-A3DE-4193-B6AA-5C449C94519F}">
   <ds:schemaRefs>

</xml_diff>